<commit_message>
Step 5. IaC: - To Review
</commit_message>
<xml_diff>
--- a/Step05-Infrastructure_as_a_Code_presentation.pptx
+++ b/Step05-Infrastructure_as_a_Code_presentation.pptx
@@ -6,7 +6,7 @@
     <p:sldMasterId id="2147483648" r:id="rId2"/>
   </p:sldMasterIdLst>
   <p:notesMasterIdLst>
-    <p:notesMasterId r:id="rId21"/>
+    <p:notesMasterId r:id="rId28"/>
   </p:notesMasterIdLst>
   <p:sldIdLst>
     <p:sldId id="302" r:id="rId3"/>
@@ -27,6 +27,13 @@
     <p:sldId id="315" r:id="rId18"/>
     <p:sldId id="316" r:id="rId19"/>
     <p:sldId id="317" r:id="rId20"/>
+    <p:sldId id="318" r:id="rId21"/>
+    <p:sldId id="319" r:id="rId22"/>
+    <p:sldId id="320" r:id="rId23"/>
+    <p:sldId id="321" r:id="rId24"/>
+    <p:sldId id="322" r:id="rId25"/>
+    <p:sldId id="323" r:id="rId26"/>
+    <p:sldId id="324" r:id="rId27"/>
   </p:sldIdLst>
   <p:sldSz cx="12192000" cy="6858000"/>
   <p:notesSz cx="6858000" cy="9144000"/>
@@ -155,7 +162,15 @@
           </p14:sldIdLst>
         </p14:section>
         <p14:section name="Ansible" id="{84DFBF41-92CA-4C22-9634-50F1DFDC41A5}">
-          <p14:sldIdLst/>
+          <p14:sldIdLst>
+            <p14:sldId id="318"/>
+            <p14:sldId id="319"/>
+            <p14:sldId id="320"/>
+            <p14:sldId id="321"/>
+            <p14:sldId id="322"/>
+            <p14:sldId id="323"/>
+            <p14:sldId id="324"/>
+          </p14:sldIdLst>
         </p14:section>
       </p14:sectionLst>
     </p:ext>
@@ -170,7 +185,7 @@
 <p1510:revInfo xmlns:a="http://schemas.openxmlformats.org/drawingml/2006/main" xmlns:r="http://schemas.openxmlformats.org/officeDocument/2006/relationships" xmlns:p1510="http://schemas.microsoft.com/office/powerpoint/2015/10/main">
   <p1510:revLst>
     <p1510:client id="{1BA64282-8772-44DD-ADE1-6DE4E20DF9D4}" v="54" dt="2024-01-31T08:21:47.738"/>
-    <p1510:client id="{CD6A1DE1-ACF9-4B80-94F3-F58CA81605B6}" v="2" dt="2024-01-31T14:09:40.233"/>
+    <p1510:client id="{CD6A1DE1-ACF9-4B80-94F3-F58CA81605B6}" v="41" dt="2024-01-31T16:36:23.744"/>
   </p1510:revLst>
 </p1510:revInfo>
 </file>
@@ -4195,7 +4210,7 @@
   <pc:docChgLst>
     <pc:chgData name="Ihor Aleksandrov" userId="c3051032-6b87-4db2-b257-777a0106fbd9" providerId="ADAL" clId="{CD6A1DE1-ACF9-4B80-94F3-F58CA81605B6}"/>
     <pc:docChg chg="undo redo custSel addSld delSld modSld sldOrd addSection delSection modSection">
-      <pc:chgData name="Ihor Aleksandrov" userId="c3051032-6b87-4db2-b257-777a0106fbd9" providerId="ADAL" clId="{CD6A1DE1-ACF9-4B80-94F3-F58CA81605B6}" dt="2024-01-31T15:06:54.085" v="166" actId="17846"/>
+      <pc:chgData name="Ihor Aleksandrov" userId="c3051032-6b87-4db2-b257-777a0106fbd9" providerId="ADAL" clId="{CD6A1DE1-ACF9-4B80-94F3-F58CA81605B6}" dt="2024-01-31T16:36:06.805" v="251" actId="20577"/>
       <pc:docMkLst>
         <pc:docMk/>
       </pc:docMkLst>
@@ -4268,6 +4283,21 @@
           </ac:spMkLst>
         </pc:spChg>
       </pc:sldChg>
+      <pc:sldChg chg="modSp">
+        <pc:chgData name="Ihor Aleksandrov" userId="c3051032-6b87-4db2-b257-777a0106fbd9" providerId="ADAL" clId="{CD6A1DE1-ACF9-4B80-94F3-F58CA81605B6}" dt="2024-01-31T16:36:06.805" v="251" actId="20577"/>
+        <pc:sldMkLst>
+          <pc:docMk/>
+          <pc:sldMk cId="2972731808" sldId="303"/>
+        </pc:sldMkLst>
+        <pc:graphicFrameChg chg="mod">
+          <ac:chgData name="Ihor Aleksandrov" userId="c3051032-6b87-4db2-b257-777a0106fbd9" providerId="ADAL" clId="{CD6A1DE1-ACF9-4B80-94F3-F58CA81605B6}" dt="2024-01-31T16:36:06.805" v="251" actId="20577"/>
+          <ac:graphicFrameMkLst>
+            <pc:docMk/>
+            <pc:sldMk cId="2972731808" sldId="303"/>
+            <ac:graphicFrameMk id="50" creationId="{438840ED-2B50-ED19-12CF-99B1789AE150}"/>
+          </ac:graphicFrameMkLst>
+        </pc:graphicFrameChg>
+      </pc:sldChg>
       <pc:sldChg chg="add">
         <pc:chgData name="Ihor Aleksandrov" userId="c3051032-6b87-4db2-b257-777a0106fbd9" providerId="ADAL" clId="{CD6A1DE1-ACF9-4B80-94F3-F58CA81605B6}" dt="2024-01-31T14:07:59.482" v="22" actId="2890"/>
         <pc:sldMkLst>
@@ -4615,6 +4645,21 @@
           <pc:sldMk cId="1315442765" sldId="318"/>
         </pc:sldMkLst>
       </pc:sldChg>
+      <pc:sldChg chg="modSp add mod ord">
+        <pc:chgData name="Ihor Aleksandrov" userId="c3051032-6b87-4db2-b257-777a0106fbd9" providerId="ADAL" clId="{CD6A1DE1-ACF9-4B80-94F3-F58CA81605B6}" dt="2024-01-31T16:18:42.992" v="170"/>
+        <pc:sldMkLst>
+          <pc:docMk/>
+          <pc:sldMk cId="2690505772" sldId="318"/>
+        </pc:sldMkLst>
+        <pc:spChg chg="mod">
+          <ac:chgData name="Ihor Aleksandrov" userId="c3051032-6b87-4db2-b257-777a0106fbd9" providerId="ADAL" clId="{CD6A1DE1-ACF9-4B80-94F3-F58CA81605B6}" dt="2024-01-31T16:18:42.992" v="170"/>
+          <ac:spMkLst>
+            <pc:docMk/>
+            <pc:sldMk cId="2690505772" sldId="318"/>
+            <ac:spMk id="2" creationId="{18C18207-A109-5552-1541-0ABBAA316282}"/>
+          </ac:spMkLst>
+        </pc:spChg>
+      </pc:sldChg>
       <pc:sldChg chg="del">
         <pc:chgData name="Ihor Aleksandrov" userId="c3051032-6b87-4db2-b257-777a0106fbd9" providerId="ADAL" clId="{CD6A1DE1-ACF9-4B80-94F3-F58CA81605B6}" dt="2024-01-31T09:09:41.621" v="12" actId="2696"/>
         <pc:sldMkLst>
@@ -4622,6 +4667,68 @@
           <pc:sldMk cId="2257188714" sldId="319"/>
         </pc:sldMkLst>
       </pc:sldChg>
+      <pc:sldChg chg="addSp delSp modSp add mod ord">
+        <pc:chgData name="Ihor Aleksandrov" userId="c3051032-6b87-4db2-b257-777a0106fbd9" providerId="ADAL" clId="{CD6A1DE1-ACF9-4B80-94F3-F58CA81605B6}" dt="2024-01-31T16:20:55.716" v="179" actId="1076"/>
+        <pc:sldMkLst>
+          <pc:docMk/>
+          <pc:sldMk cId="3618741339" sldId="319"/>
+        </pc:sldMkLst>
+        <pc:spChg chg="mod">
+          <ac:chgData name="Ihor Aleksandrov" userId="c3051032-6b87-4db2-b257-777a0106fbd9" providerId="ADAL" clId="{CD6A1DE1-ACF9-4B80-94F3-F58CA81605B6}" dt="2024-01-31T16:20:19.318" v="174"/>
+          <ac:spMkLst>
+            <pc:docMk/>
+            <pc:sldMk cId="3618741339" sldId="319"/>
+            <ac:spMk id="2" creationId="{53C5D828-9666-E312-B574-9FE965A7D6BE}"/>
+          </ac:spMkLst>
+        </pc:spChg>
+        <pc:spChg chg="del">
+          <ac:chgData name="Ihor Aleksandrov" userId="c3051032-6b87-4db2-b257-777a0106fbd9" providerId="ADAL" clId="{CD6A1DE1-ACF9-4B80-94F3-F58CA81605B6}" dt="2024-01-31T16:20:22.303" v="175" actId="478"/>
+          <ac:spMkLst>
+            <pc:docMk/>
+            <pc:sldMk cId="3618741339" sldId="319"/>
+            <ac:spMk id="4" creationId="{A7A10FCB-73CC-EC25-5BA2-8A25FEB14B6A}"/>
+          </ac:spMkLst>
+        </pc:spChg>
+        <pc:picChg chg="add mod">
+          <ac:chgData name="Ihor Aleksandrov" userId="c3051032-6b87-4db2-b257-777a0106fbd9" providerId="ADAL" clId="{CD6A1DE1-ACF9-4B80-94F3-F58CA81605B6}" dt="2024-01-31T16:20:55.716" v="179" actId="1076"/>
+          <ac:picMkLst>
+            <pc:docMk/>
+            <pc:sldMk cId="3618741339" sldId="319"/>
+            <ac:picMk id="5" creationId="{F532E8B4-0BE7-0CB3-9EF5-566DC21B1A9C}"/>
+          </ac:picMkLst>
+        </pc:picChg>
+      </pc:sldChg>
+      <pc:sldChg chg="addSp delSp modSp add mod">
+        <pc:chgData name="Ihor Aleksandrov" userId="c3051032-6b87-4db2-b257-777a0106fbd9" providerId="ADAL" clId="{CD6A1DE1-ACF9-4B80-94F3-F58CA81605B6}" dt="2024-01-31T16:23:53.931" v="186" actId="1076"/>
+        <pc:sldMkLst>
+          <pc:docMk/>
+          <pc:sldMk cId="955539517" sldId="320"/>
+        </pc:sldMkLst>
+        <pc:spChg chg="mod">
+          <ac:chgData name="Ihor Aleksandrov" userId="c3051032-6b87-4db2-b257-777a0106fbd9" providerId="ADAL" clId="{CD6A1DE1-ACF9-4B80-94F3-F58CA81605B6}" dt="2024-01-31T16:23:45.804" v="183"/>
+          <ac:spMkLst>
+            <pc:docMk/>
+            <pc:sldMk cId="955539517" sldId="320"/>
+            <ac:spMk id="2" creationId="{53C5D828-9666-E312-B574-9FE965A7D6BE}"/>
+          </ac:spMkLst>
+        </pc:spChg>
+        <pc:picChg chg="add mod">
+          <ac:chgData name="Ihor Aleksandrov" userId="c3051032-6b87-4db2-b257-777a0106fbd9" providerId="ADAL" clId="{CD6A1DE1-ACF9-4B80-94F3-F58CA81605B6}" dt="2024-01-31T16:23:53.931" v="186" actId="1076"/>
+          <ac:picMkLst>
+            <pc:docMk/>
+            <pc:sldMk cId="955539517" sldId="320"/>
+            <ac:picMk id="4" creationId="{28A2D3FD-7D05-8035-871B-BC18824DA49F}"/>
+          </ac:picMkLst>
+        </pc:picChg>
+        <pc:picChg chg="del">
+          <ac:chgData name="Ihor Aleksandrov" userId="c3051032-6b87-4db2-b257-777a0106fbd9" providerId="ADAL" clId="{CD6A1DE1-ACF9-4B80-94F3-F58CA81605B6}" dt="2024-01-31T16:23:47.155" v="184" actId="478"/>
+          <ac:picMkLst>
+            <pc:docMk/>
+            <pc:sldMk cId="955539517" sldId="320"/>
+            <ac:picMk id="5" creationId="{F532E8B4-0BE7-0CB3-9EF5-566DC21B1A9C}"/>
+          </ac:picMkLst>
+        </pc:picChg>
+      </pc:sldChg>
       <pc:sldChg chg="del">
         <pc:chgData name="Ihor Aleksandrov" userId="c3051032-6b87-4db2-b257-777a0106fbd9" providerId="ADAL" clId="{CD6A1DE1-ACF9-4B80-94F3-F58CA81605B6}" dt="2024-01-31T09:09:41.621" v="12" actId="2696"/>
         <pc:sldMkLst>
@@ -4636,6 +4743,37 @@
           <pc:sldMk cId="2741142378" sldId="321"/>
         </pc:sldMkLst>
       </pc:sldChg>
+      <pc:sldChg chg="addSp delSp modSp add mod">
+        <pc:chgData name="Ihor Aleksandrov" userId="c3051032-6b87-4db2-b257-777a0106fbd9" providerId="ADAL" clId="{CD6A1DE1-ACF9-4B80-94F3-F58CA81605B6}" dt="2024-01-31T16:27:29.733" v="196" actId="1076"/>
+        <pc:sldMkLst>
+          <pc:docMk/>
+          <pc:sldMk cId="3974958853" sldId="321"/>
+        </pc:sldMkLst>
+        <pc:spChg chg="mod">
+          <ac:chgData name="Ihor Aleksandrov" userId="c3051032-6b87-4db2-b257-777a0106fbd9" providerId="ADAL" clId="{CD6A1DE1-ACF9-4B80-94F3-F58CA81605B6}" dt="2024-01-31T16:27:07.186" v="192"/>
+          <ac:spMkLst>
+            <pc:docMk/>
+            <pc:sldMk cId="3974958853" sldId="321"/>
+            <ac:spMk id="2" creationId="{53C5D828-9666-E312-B574-9FE965A7D6BE}"/>
+          </ac:spMkLst>
+        </pc:spChg>
+        <pc:picChg chg="del">
+          <ac:chgData name="Ihor Aleksandrov" userId="c3051032-6b87-4db2-b257-777a0106fbd9" providerId="ADAL" clId="{CD6A1DE1-ACF9-4B80-94F3-F58CA81605B6}" dt="2024-01-31T16:27:22.384" v="193" actId="478"/>
+          <ac:picMkLst>
+            <pc:docMk/>
+            <pc:sldMk cId="3974958853" sldId="321"/>
+            <ac:picMk id="4" creationId="{28A2D3FD-7D05-8035-871B-BC18824DA49F}"/>
+          </ac:picMkLst>
+        </pc:picChg>
+        <pc:picChg chg="add mod">
+          <ac:chgData name="Ihor Aleksandrov" userId="c3051032-6b87-4db2-b257-777a0106fbd9" providerId="ADAL" clId="{CD6A1DE1-ACF9-4B80-94F3-F58CA81605B6}" dt="2024-01-31T16:27:29.733" v="196" actId="1076"/>
+          <ac:picMkLst>
+            <pc:docMk/>
+            <pc:sldMk cId="3974958853" sldId="321"/>
+            <ac:picMk id="6" creationId="{B6424C26-77F8-976F-095A-C034C68F13F1}"/>
+          </ac:picMkLst>
+        </pc:picChg>
+      </pc:sldChg>
       <pc:sldChg chg="del">
         <pc:chgData name="Ihor Aleksandrov" userId="c3051032-6b87-4db2-b257-777a0106fbd9" providerId="ADAL" clId="{CD6A1DE1-ACF9-4B80-94F3-F58CA81605B6}" dt="2024-01-31T09:09:41.621" v="12" actId="2696"/>
         <pc:sldMkLst>
@@ -4643,6 +4781,68 @@
           <pc:sldMk cId="1250702623" sldId="322"/>
         </pc:sldMkLst>
       </pc:sldChg>
+      <pc:sldChg chg="addSp delSp modSp add mod">
+        <pc:chgData name="Ihor Aleksandrov" userId="c3051032-6b87-4db2-b257-777a0106fbd9" providerId="ADAL" clId="{CD6A1DE1-ACF9-4B80-94F3-F58CA81605B6}" dt="2024-01-31T16:30:11.818" v="204"/>
+        <pc:sldMkLst>
+          <pc:docMk/>
+          <pc:sldMk cId="3021423085" sldId="322"/>
+        </pc:sldMkLst>
+        <pc:spChg chg="mod">
+          <ac:chgData name="Ihor Aleksandrov" userId="c3051032-6b87-4db2-b257-777a0106fbd9" providerId="ADAL" clId="{CD6A1DE1-ACF9-4B80-94F3-F58CA81605B6}" dt="2024-01-31T16:30:11.818" v="204"/>
+          <ac:spMkLst>
+            <pc:docMk/>
+            <pc:sldMk cId="3021423085" sldId="322"/>
+            <ac:spMk id="2" creationId="{53C5D828-9666-E312-B574-9FE965A7D6BE}"/>
+          </ac:spMkLst>
+        </pc:spChg>
+        <pc:picChg chg="add mod">
+          <ac:chgData name="Ihor Aleksandrov" userId="c3051032-6b87-4db2-b257-777a0106fbd9" providerId="ADAL" clId="{CD6A1DE1-ACF9-4B80-94F3-F58CA81605B6}" dt="2024-01-31T16:29:33.614" v="201" actId="1076"/>
+          <ac:picMkLst>
+            <pc:docMk/>
+            <pc:sldMk cId="3021423085" sldId="322"/>
+            <ac:picMk id="5" creationId="{79E04EF6-B44B-E770-0D59-0AE9905B0613}"/>
+          </ac:picMkLst>
+        </pc:picChg>
+        <pc:picChg chg="del">
+          <ac:chgData name="Ihor Aleksandrov" userId="c3051032-6b87-4db2-b257-777a0106fbd9" providerId="ADAL" clId="{CD6A1DE1-ACF9-4B80-94F3-F58CA81605B6}" dt="2024-01-31T16:29:27.557" v="198" actId="478"/>
+          <ac:picMkLst>
+            <pc:docMk/>
+            <pc:sldMk cId="3021423085" sldId="322"/>
+            <ac:picMk id="6" creationId="{B6424C26-77F8-976F-095A-C034C68F13F1}"/>
+          </ac:picMkLst>
+        </pc:picChg>
+      </pc:sldChg>
+      <pc:sldChg chg="addSp delSp modSp add mod">
+        <pc:chgData name="Ihor Aleksandrov" userId="c3051032-6b87-4db2-b257-777a0106fbd9" providerId="ADAL" clId="{CD6A1DE1-ACF9-4B80-94F3-F58CA81605B6}" dt="2024-01-31T16:32:26.979" v="210" actId="11529"/>
+        <pc:sldMkLst>
+          <pc:docMk/>
+          <pc:sldMk cId="816537371" sldId="323"/>
+        </pc:sldMkLst>
+        <pc:spChg chg="mod">
+          <ac:chgData name="Ihor Aleksandrov" userId="c3051032-6b87-4db2-b257-777a0106fbd9" providerId="ADAL" clId="{CD6A1DE1-ACF9-4B80-94F3-F58CA81605B6}" dt="2024-01-31T16:32:20.906" v="208"/>
+          <ac:spMkLst>
+            <pc:docMk/>
+            <pc:sldMk cId="816537371" sldId="323"/>
+            <ac:spMk id="2" creationId="{53C5D828-9666-E312-B574-9FE965A7D6BE}"/>
+          </ac:spMkLst>
+        </pc:spChg>
+        <pc:spChg chg="add">
+          <ac:chgData name="Ihor Aleksandrov" userId="c3051032-6b87-4db2-b257-777a0106fbd9" providerId="ADAL" clId="{CD6A1DE1-ACF9-4B80-94F3-F58CA81605B6}" dt="2024-01-31T16:32:26.979" v="210" actId="11529"/>
+          <ac:spMkLst>
+            <pc:docMk/>
+            <pc:sldMk cId="816537371" sldId="323"/>
+            <ac:spMk id="4" creationId="{03542100-9D21-41B2-EBC8-F5312B69ACDA}"/>
+          </ac:spMkLst>
+        </pc:spChg>
+        <pc:picChg chg="del">
+          <ac:chgData name="Ihor Aleksandrov" userId="c3051032-6b87-4db2-b257-777a0106fbd9" providerId="ADAL" clId="{CD6A1DE1-ACF9-4B80-94F3-F58CA81605B6}" dt="2024-01-31T16:32:22.331" v="209" actId="478"/>
+          <ac:picMkLst>
+            <pc:docMk/>
+            <pc:sldMk cId="816537371" sldId="323"/>
+            <ac:picMk id="5" creationId="{79E04EF6-B44B-E770-0D59-0AE9905B0613}"/>
+          </ac:picMkLst>
+        </pc:picChg>
+      </pc:sldChg>
       <pc:sldChg chg="del">
         <pc:chgData name="Ihor Aleksandrov" userId="c3051032-6b87-4db2-b257-777a0106fbd9" providerId="ADAL" clId="{CD6A1DE1-ACF9-4B80-94F3-F58CA81605B6}" dt="2024-01-31T09:09:41.621" v="12" actId="2696"/>
         <pc:sldMkLst>
@@ -4656,6 +4856,21 @@
           <pc:docMk/>
           <pc:sldMk cId="3008917412" sldId="324"/>
         </pc:sldMkLst>
+      </pc:sldChg>
+      <pc:sldChg chg="modSp add mod">
+        <pc:chgData name="Ihor Aleksandrov" userId="c3051032-6b87-4db2-b257-777a0106fbd9" providerId="ADAL" clId="{CD6A1DE1-ACF9-4B80-94F3-F58CA81605B6}" dt="2024-01-31T16:33:14.683" v="218" actId="20577"/>
+        <pc:sldMkLst>
+          <pc:docMk/>
+          <pc:sldMk cId="3114329589" sldId="324"/>
+        </pc:sldMkLst>
+        <pc:spChg chg="mod">
+          <ac:chgData name="Ihor Aleksandrov" userId="c3051032-6b87-4db2-b257-777a0106fbd9" providerId="ADAL" clId="{CD6A1DE1-ACF9-4B80-94F3-F58CA81605B6}" dt="2024-01-31T16:33:14.683" v="218" actId="20577"/>
+          <ac:spMkLst>
+            <pc:docMk/>
+            <pc:sldMk cId="3114329589" sldId="324"/>
+            <ac:spMk id="2" creationId="{53C5D828-9666-E312-B574-9FE965A7D6BE}"/>
+          </ac:spMkLst>
+        </pc:spChg>
       </pc:sldChg>
       <pc:sldChg chg="del">
         <pc:chgData name="Ihor Aleksandrov" userId="c3051032-6b87-4db2-b257-777a0106fbd9" providerId="ADAL" clId="{CD6A1DE1-ACF9-4B80-94F3-F58CA81605B6}" dt="2024-01-31T09:09:41.621" v="12" actId="2696"/>
@@ -5551,7 +5766,7 @@
         <a:p>
           <a:r>
             <a:rPr lang="en-US" dirty="0"/>
-            <a:t>Cloud Computing</a:t>
+            <a:t>Terraform</a:t>
           </a:r>
         </a:p>
       </dgm:t>
@@ -5593,9 +5808,10 @@
         <a:lstStyle/>
         <a:p>
           <a:r>
-            <a:rPr lang="en-US" dirty="0"/>
-            <a:t>AWS</a:t>
+            <a:rPr lang="en-US"/>
+            <a:t>Ansible</a:t>
           </a:r>
+          <a:endParaRPr lang="en-US" dirty="0"/>
         </a:p>
       </dgm:t>
       <dgm:extLst>
@@ -5628,49 +5844,6 @@
         </a:p>
       </dgm:t>
     </dgm:pt>
-    <dgm:pt modelId="{2B7ED56E-EBC9-461A-8FD4-163FA2169B7C}">
-      <dgm:prSet/>
-      <dgm:spPr/>
-      <dgm:t>
-        <a:bodyPr/>
-        <a:lstStyle/>
-        <a:p>
-          <a:r>
-            <a:rPr lang="en-US" dirty="0"/>
-            <a:t>Azure</a:t>
-          </a:r>
-        </a:p>
-      </dgm:t>
-      <dgm:extLst>
-        <a:ext uri="{E40237B7-FDA0-4F09-8148-C483321AD2D9}">
-          <dgm14:cNvPr xmlns:dgm14="http://schemas.microsoft.com/office/drawing/2010/diagram" id="0" name="">
-            <a:hlinkClick xmlns:r="http://schemas.openxmlformats.org/officeDocument/2006/relationships" r:id="" action="ppaction://noaction"/>
-          </dgm14:cNvPr>
-        </a:ext>
-      </dgm:extLst>
-    </dgm:pt>
-    <dgm:pt modelId="{C71D7821-CC2C-4ED6-BFBE-FAE3CC2E8DA1}" type="parTrans" cxnId="{BF555944-BDA0-488C-8626-E7431C0B2A69}">
-      <dgm:prSet/>
-      <dgm:spPr/>
-      <dgm:t>
-        <a:bodyPr/>
-        <a:lstStyle/>
-        <a:p>
-          <a:endParaRPr lang="ru-UA"/>
-        </a:p>
-      </dgm:t>
-    </dgm:pt>
-    <dgm:pt modelId="{CD9A4AA0-7D39-41C7-9C1A-118ECBD08BD8}" type="sibTrans" cxnId="{BF555944-BDA0-488C-8626-E7431C0B2A69}">
-      <dgm:prSet/>
-      <dgm:spPr/>
-      <dgm:t>
-        <a:bodyPr/>
-        <a:lstStyle/>
-        <a:p>
-          <a:endParaRPr lang="ru-UA"/>
-        </a:p>
-      </dgm:t>
-    </dgm:pt>
     <dgm:pt modelId="{76D6B6BC-F8F0-4466-930A-673E438AD175}" type="pres">
       <dgm:prSet presAssocID="{1C600E66-A0CB-470F-8514-C91590285CB3}" presName="Name0" presStyleCnt="0">
         <dgm:presLayoutVars>
@@ -5686,7 +5859,7 @@
       <dgm:spPr/>
     </dgm:pt>
     <dgm:pt modelId="{FF5931E5-6577-45BF-AE5E-698950A6CB7C}" type="pres">
-      <dgm:prSet presAssocID="{64E9ACE6-9AFD-4BBA-80CB-01DA1300E087}" presName="parentText" presStyleLbl="node1" presStyleIdx="0" presStyleCnt="3">
+      <dgm:prSet presAssocID="{64E9ACE6-9AFD-4BBA-80CB-01DA1300E087}" presName="parentText" presStyleLbl="node1" presStyleIdx="0" presStyleCnt="2">
         <dgm:presLayoutVars>
           <dgm:chMax val="1"/>
           <dgm:bulletEnabled val="1"/>
@@ -5703,24 +5876,7 @@
       <dgm:spPr/>
     </dgm:pt>
     <dgm:pt modelId="{B6CE390F-56AC-45A8-A0DF-3A7B8C2FEB1E}" type="pres">
-      <dgm:prSet presAssocID="{2240D41D-9269-4094-AEBC-1664425632DB}" presName="parentText" presStyleLbl="node1" presStyleIdx="1" presStyleCnt="3">
-        <dgm:presLayoutVars>
-          <dgm:chMax val="1"/>
-          <dgm:bulletEnabled val="1"/>
-        </dgm:presLayoutVars>
-      </dgm:prSet>
-      <dgm:spPr/>
-    </dgm:pt>
-    <dgm:pt modelId="{FF48DE76-B89B-4A74-A00B-7781F893FA11}" type="pres">
-      <dgm:prSet presAssocID="{474E530C-8388-441E-8514-9E5C43069E6C}" presName="sp" presStyleCnt="0"/>
-      <dgm:spPr/>
-    </dgm:pt>
-    <dgm:pt modelId="{3E340D75-502F-4147-A22B-12FB71A3EA65}" type="pres">
-      <dgm:prSet presAssocID="{2B7ED56E-EBC9-461A-8FD4-163FA2169B7C}" presName="linNode" presStyleCnt="0"/>
-      <dgm:spPr/>
-    </dgm:pt>
-    <dgm:pt modelId="{9C41D13D-9CC8-48E3-B766-D9CB4071F417}" type="pres">
-      <dgm:prSet presAssocID="{2B7ED56E-EBC9-461A-8FD4-163FA2169B7C}" presName="parentText" presStyleLbl="node1" presStyleIdx="2" presStyleCnt="3">
+      <dgm:prSet presAssocID="{2240D41D-9269-4094-AEBC-1664425632DB}" presName="parentText" presStyleLbl="node1" presStyleIdx="1" presStyleCnt="2">
         <dgm:presLayoutVars>
           <dgm:chMax val="1"/>
           <dgm:bulletEnabled val="1"/>
@@ -5730,8 +5886,6 @@
     </dgm:pt>
   </dgm:ptLst>
   <dgm:cxnLst>
-    <dgm:cxn modelId="{20091702-3A6F-42AF-AB1A-21EEAB08BD84}" type="presOf" srcId="{2B7ED56E-EBC9-461A-8FD4-163FA2169B7C}" destId="{9C41D13D-9CC8-48E3-B766-D9CB4071F417}" srcOrd="0" destOrd="0" presId="urn:microsoft.com/office/officeart/2005/8/layout/vList5"/>
-    <dgm:cxn modelId="{BF555944-BDA0-488C-8626-E7431C0B2A69}" srcId="{1C600E66-A0CB-470F-8514-C91590285CB3}" destId="{2B7ED56E-EBC9-461A-8FD4-163FA2169B7C}" srcOrd="2" destOrd="0" parTransId="{C71D7821-CC2C-4ED6-BFBE-FAE3CC2E8DA1}" sibTransId="{CD9A4AA0-7D39-41C7-9C1A-118ECBD08BD8}"/>
     <dgm:cxn modelId="{5164DF79-C7E6-4470-A977-53A07031A3C0}" type="presOf" srcId="{1C600E66-A0CB-470F-8514-C91590285CB3}" destId="{76D6B6BC-F8F0-4466-930A-673E438AD175}" srcOrd="0" destOrd="0" presId="urn:microsoft.com/office/officeart/2005/8/layout/vList5"/>
     <dgm:cxn modelId="{99A6CC83-AE40-4A47-9C08-1C60E1C3B682}" srcId="{1C600E66-A0CB-470F-8514-C91590285CB3}" destId="{2240D41D-9269-4094-AEBC-1664425632DB}" srcOrd="1" destOrd="0" parTransId="{23766FE5-DD90-4BD8-82A9-33CBDF55210E}" sibTransId="{474E530C-8388-441E-8514-9E5C43069E6C}"/>
     <dgm:cxn modelId="{30C6AD8A-2368-4D50-9E5F-AACEB3623078}" type="presOf" srcId="{2240D41D-9269-4094-AEBC-1664425632DB}" destId="{B6CE390F-56AC-45A8-A0DF-3A7B8C2FEB1E}" srcOrd="0" destOrd="0" presId="urn:microsoft.com/office/officeart/2005/8/layout/vList5"/>
@@ -5742,9 +5896,6 @@
     <dgm:cxn modelId="{A1CEFADC-E666-418E-A8EF-60AF891E80F1}" type="presParOf" srcId="{76D6B6BC-F8F0-4466-930A-673E438AD175}" destId="{4ECE9EB2-DDA7-42FC-BF9E-18B0138FE3B5}" srcOrd="1" destOrd="0" presId="urn:microsoft.com/office/officeart/2005/8/layout/vList5"/>
     <dgm:cxn modelId="{EA31EEF1-153D-49E7-9DDC-711023DD751D}" type="presParOf" srcId="{76D6B6BC-F8F0-4466-930A-673E438AD175}" destId="{365DAA1E-0EA2-4779-BA2C-86211B24E914}" srcOrd="2" destOrd="0" presId="urn:microsoft.com/office/officeart/2005/8/layout/vList5"/>
     <dgm:cxn modelId="{6BFF6DAC-E656-484E-8838-F79ECABD3DD1}" type="presParOf" srcId="{365DAA1E-0EA2-4779-BA2C-86211B24E914}" destId="{B6CE390F-56AC-45A8-A0DF-3A7B8C2FEB1E}" srcOrd="0" destOrd="0" presId="urn:microsoft.com/office/officeart/2005/8/layout/vList5"/>
-    <dgm:cxn modelId="{D765BC93-E9CA-4FCD-9D9E-58F39FC16382}" type="presParOf" srcId="{76D6B6BC-F8F0-4466-930A-673E438AD175}" destId="{FF48DE76-B89B-4A74-A00B-7781F893FA11}" srcOrd="3" destOrd="0" presId="urn:microsoft.com/office/officeart/2005/8/layout/vList5"/>
-    <dgm:cxn modelId="{A14AD7B0-BB9C-48B0-8938-D227B4AFC8CB}" type="presParOf" srcId="{76D6B6BC-F8F0-4466-930A-673E438AD175}" destId="{3E340D75-502F-4147-A22B-12FB71A3EA65}" srcOrd="4" destOrd="0" presId="urn:microsoft.com/office/officeart/2005/8/layout/vList5"/>
-    <dgm:cxn modelId="{F4703A48-C8E3-48BF-8498-747A5B122CF1}" type="presParOf" srcId="{3E340D75-502F-4147-A22B-12FB71A3EA65}" destId="{9C41D13D-9CC8-48E3-B766-D9CB4071F417}" srcOrd="0" destOrd="0" presId="urn:microsoft.com/office/officeart/2005/8/layout/vList5"/>
   </dgm:cxnLst>
   <dgm:bg/>
   <dgm:whole/>
@@ -5771,8 +5922,8 @@
       </dsp:nvSpPr>
       <dsp:spPr>
         <a:xfrm>
-          <a:off x="2044999" y="1711"/>
-          <a:ext cx="2300624" cy="1129605"/>
+          <a:off x="2044999" y="42"/>
+          <a:ext cx="2300624" cy="1709811"/>
         </a:xfrm>
         <a:prstGeom prst="roundRect">
           <a:avLst/>
@@ -5814,12 +5965,12 @@
         </a:fontRef>
       </dsp:style>
       <dsp:txBody>
-        <a:bodyPr spcFirstLastPara="0" vert="horz" wrap="square" lIns="121920" tIns="60960" rIns="121920" bIns="60960" numCol="1" spcCol="1270" anchor="ctr" anchorCtr="0">
+        <a:bodyPr spcFirstLastPara="0" vert="horz" wrap="square" lIns="133350" tIns="66675" rIns="133350" bIns="66675" numCol="1" spcCol="1270" anchor="ctr" anchorCtr="0">
           <a:noAutofit/>
         </a:bodyPr>
         <a:lstStyle/>
         <a:p>
-          <a:pPr marL="0" lvl="0" indent="0" algn="ctr" defTabSz="1422400">
+          <a:pPr marL="0" lvl="0" indent="0" algn="ctr" defTabSz="1555750">
             <a:lnSpc>
               <a:spcPct val="90000"/>
             </a:lnSpc>
@@ -5832,14 +5983,14 @@
             <a:buNone/>
           </a:pPr>
           <a:r>
-            <a:rPr lang="en-US" sz="3200" kern="1200" dirty="0"/>
-            <a:t>Cloud Computing</a:t>
+            <a:rPr lang="en-US" sz="3500" kern="1200" dirty="0"/>
+            <a:t>Terraform</a:t>
           </a:r>
         </a:p>
       </dsp:txBody>
       <dsp:txXfrm>
-        <a:off x="2100142" y="56854"/>
-        <a:ext cx="2190338" cy="1019319"/>
+        <a:off x="2128465" y="83508"/>
+        <a:ext cx="2133692" cy="1542879"/>
       </dsp:txXfrm>
     </dsp:sp>
     <dsp:sp modelId="{B6CE390F-56AC-45A8-A0DF-3A7B8C2FEB1E}">
@@ -5849,8 +6000,8 @@
       </dsp:nvSpPr>
       <dsp:spPr>
         <a:xfrm>
-          <a:off x="2044999" y="1187797"/>
-          <a:ext cx="2300624" cy="1129605"/>
+          <a:off x="2044999" y="1795345"/>
+          <a:ext cx="2300624" cy="1709811"/>
         </a:xfrm>
         <a:prstGeom prst="roundRect">
           <a:avLst/>
@@ -5892,12 +6043,12 @@
         </a:fontRef>
       </dsp:style>
       <dsp:txBody>
-        <a:bodyPr spcFirstLastPara="0" vert="horz" wrap="square" lIns="121920" tIns="60960" rIns="121920" bIns="60960" numCol="1" spcCol="1270" anchor="ctr" anchorCtr="0">
+        <a:bodyPr spcFirstLastPara="0" vert="horz" wrap="square" lIns="133350" tIns="66675" rIns="133350" bIns="66675" numCol="1" spcCol="1270" anchor="ctr" anchorCtr="0">
           <a:noAutofit/>
         </a:bodyPr>
         <a:lstStyle/>
         <a:p>
-          <a:pPr marL="0" lvl="0" indent="0" algn="ctr" defTabSz="1422400">
+          <a:pPr marL="0" lvl="0" indent="0" algn="ctr" defTabSz="1555750">
             <a:lnSpc>
               <a:spcPct val="90000"/>
             </a:lnSpc>
@@ -5910,92 +6061,15 @@
             <a:buNone/>
           </a:pPr>
           <a:r>
-            <a:rPr lang="en-US" sz="3200" kern="1200" dirty="0"/>
-            <a:t>AWS</a:t>
+            <a:rPr lang="en-US" sz="3500" kern="1200"/>
+            <a:t>Ansible</a:t>
           </a:r>
+          <a:endParaRPr lang="en-US" sz="3500" kern="1200" dirty="0"/>
         </a:p>
       </dsp:txBody>
       <dsp:txXfrm>
-        <a:off x="2100142" y="1242940"/>
-        <a:ext cx="2190338" cy="1019319"/>
-      </dsp:txXfrm>
-    </dsp:sp>
-    <dsp:sp modelId="{9C41D13D-9CC8-48E3-B766-D9CB4071F417}">
-      <dsp:nvSpPr>
-        <dsp:cNvPr id="0" name=""/>
-        <dsp:cNvSpPr/>
-      </dsp:nvSpPr>
-      <dsp:spPr>
-        <a:xfrm>
-          <a:off x="2044999" y="2373883"/>
-          <a:ext cx="2300624" cy="1129605"/>
-        </a:xfrm>
-        <a:prstGeom prst="roundRect">
-          <a:avLst/>
-        </a:prstGeom>
-        <a:solidFill>
-          <a:schemeClr val="accent1">
-            <a:hueOff val="0"/>
-            <a:satOff val="0"/>
-            <a:lumOff val="0"/>
-            <a:alphaOff val="0"/>
-          </a:schemeClr>
-        </a:solidFill>
-        <a:ln w="12700" cap="flat" cmpd="sng" algn="ctr">
-          <a:solidFill>
-            <a:schemeClr val="lt1">
-              <a:hueOff val="0"/>
-              <a:satOff val="0"/>
-              <a:lumOff val="0"/>
-              <a:alphaOff val="0"/>
-            </a:schemeClr>
-          </a:solidFill>
-          <a:prstDash val="solid"/>
-          <a:miter lim="800000"/>
-        </a:ln>
-        <a:effectLst/>
-      </dsp:spPr>
-      <dsp:style>
-        <a:lnRef idx="2">
-          <a:scrgbClr r="0" g="0" b="0"/>
-        </a:lnRef>
-        <a:fillRef idx="1">
-          <a:scrgbClr r="0" g="0" b="0"/>
-        </a:fillRef>
-        <a:effectRef idx="0">
-          <a:scrgbClr r="0" g="0" b="0"/>
-        </a:effectRef>
-        <a:fontRef idx="minor">
-          <a:schemeClr val="lt1"/>
-        </a:fontRef>
-      </dsp:style>
-      <dsp:txBody>
-        <a:bodyPr spcFirstLastPara="0" vert="horz" wrap="square" lIns="121920" tIns="60960" rIns="121920" bIns="60960" numCol="1" spcCol="1270" anchor="ctr" anchorCtr="0">
-          <a:noAutofit/>
-        </a:bodyPr>
-        <a:lstStyle/>
-        <a:p>
-          <a:pPr marL="0" lvl="0" indent="0" algn="ctr" defTabSz="1422400">
-            <a:lnSpc>
-              <a:spcPct val="90000"/>
-            </a:lnSpc>
-            <a:spcBef>
-              <a:spcPct val="0"/>
-            </a:spcBef>
-            <a:spcAft>
-              <a:spcPct val="35000"/>
-            </a:spcAft>
-            <a:buNone/>
-          </a:pPr>
-          <a:r>
-            <a:rPr lang="en-US" sz="3200" kern="1200" dirty="0"/>
-            <a:t>Azure</a:t>
-          </a:r>
-        </a:p>
-      </dsp:txBody>
-      <dsp:txXfrm>
-        <a:off x="2100142" y="2429026"/>
-        <a:ext cx="2190338" cy="1019319"/>
+        <a:off x="2128465" y="1878811"/>
+        <a:ext cx="2133692" cy="1542879"/>
       </dsp:txXfrm>
     </dsp:sp>
   </dsp:spTree>
@@ -14260,6 +14334,269 @@
 </p:sld>
 </file>
 
+<file path=ppt/slides/slide19.xml><?xml version="1.0" encoding="utf-8"?>
+<p:sld xmlns:a="http://schemas.openxmlformats.org/drawingml/2006/main" xmlns:r="http://schemas.openxmlformats.org/officeDocument/2006/relationships" xmlns:p="http://schemas.openxmlformats.org/presentationml/2006/main">
+  <p:cSld>
+    <p:bg>
+      <p:bgPr>
+        <a:solidFill>
+          <a:schemeClr val="bg1"/>
+        </a:solidFill>
+        <a:effectLst/>
+      </p:bgPr>
+    </p:bg>
+    <p:spTree>
+      <p:nvGrpSpPr>
+        <p:cNvPr id="1" name=""/>
+        <p:cNvGrpSpPr/>
+        <p:nvPr/>
+      </p:nvGrpSpPr>
+      <p:grpSpPr>
+        <a:xfrm>
+          <a:off x="0" y="0"/>
+          <a:ext cx="0" cy="0"/>
+          <a:chOff x="0" y="0"/>
+          <a:chExt cx="0" cy="0"/>
+        </a:xfrm>
+      </p:grpSpPr>
+      <p:sp>
+        <p:nvSpPr>
+          <p:cNvPr id="9" name="Rectangle 8">
+            <a:extLst>
+              <a:ext uri="{FF2B5EF4-FFF2-40B4-BE49-F238E27FC236}">
+                <a16:creationId xmlns:a16="http://schemas.microsoft.com/office/drawing/2014/main" id="{C3896A03-3945-419A-B66B-4EE266EDD152}"/>
+              </a:ext>
+              <a:ext uri="{C183D7F6-B498-43B3-948B-1728B52AA6E4}">
+                <adec:decorative xmlns:adec="http://schemas.microsoft.com/office/drawing/2017/decorative" val="1"/>
+              </a:ext>
+            </a:extLst>
+          </p:cNvPr>
+          <p:cNvSpPr>
+            <a:spLocks noGrp="1" noRot="1" noChangeAspect="1" noMove="1" noResize="1" noEditPoints="1" noAdjustHandles="1" noChangeArrowheads="1" noChangeShapeType="1" noTextEdit="1"/>
+          </p:cNvSpPr>
+          <p:nvPr>
+            <p:extLst>
+              <p:ext uri="{386F3935-93C4-4BCD-93E2-E3B085C9AB24}">
+                <p16:designElem xmlns:p16="http://schemas.microsoft.com/office/powerpoint/2015/main" val="1"/>
+              </p:ext>
+            </p:extLst>
+          </p:nvPr>
+        </p:nvSpPr>
+        <p:spPr>
+          <a:xfrm>
+            <a:off x="10" y="0"/>
+            <a:ext cx="6083447" cy="6858001"/>
+          </a:xfrm>
+          <a:prstGeom prst="rect">
+            <a:avLst/>
+          </a:prstGeom>
+          <a:solidFill>
+            <a:schemeClr val="tx1">
+              <a:lumMod val="85000"/>
+              <a:lumOff val="15000"/>
+            </a:schemeClr>
+          </a:solidFill>
+          <a:ln>
+            <a:noFill/>
+          </a:ln>
+        </p:spPr>
+        <p:style>
+          <a:lnRef idx="2">
+            <a:schemeClr val="accent1">
+              <a:shade val="50000"/>
+            </a:schemeClr>
+          </a:lnRef>
+          <a:fillRef idx="1">
+            <a:schemeClr val="accent1"/>
+          </a:fillRef>
+          <a:effectRef idx="0">
+            <a:schemeClr val="accent1"/>
+          </a:effectRef>
+          <a:fontRef idx="minor">
+            <a:schemeClr val="lt1"/>
+          </a:fontRef>
+        </p:style>
+        <p:txBody>
+          <a:bodyPr rtlCol="0" anchor="ctr"/>
+          <a:lstStyle/>
+          <a:p>
+            <a:pPr algn="ctr"/>
+            <a:endParaRPr lang="en-US"/>
+          </a:p>
+        </p:txBody>
+      </p:sp>
+      <p:sp>
+        <p:nvSpPr>
+          <p:cNvPr id="2" name="Title 1">
+            <a:extLst>
+              <a:ext uri="{FF2B5EF4-FFF2-40B4-BE49-F238E27FC236}">
+                <a16:creationId xmlns:a16="http://schemas.microsoft.com/office/drawing/2014/main" id="{18C18207-A109-5552-1541-0ABBAA316282}"/>
+              </a:ext>
+            </a:extLst>
+          </p:cNvPr>
+          <p:cNvSpPr>
+            <a:spLocks noGrp="1"/>
+          </p:cNvSpPr>
+          <p:nvPr>
+            <p:ph type="ctrTitle"/>
+          </p:nvPr>
+        </p:nvSpPr>
+        <p:spPr>
+          <a:xfrm>
+            <a:off x="1155558" y="637762"/>
+            <a:ext cx="4284397" cy="5576770"/>
+          </a:xfrm>
+        </p:spPr>
+        <p:txBody>
+          <a:bodyPr anchor="ctr">
+            <a:normAutofit/>
+          </a:bodyPr>
+          <a:lstStyle/>
+          <a:p>
+            <a:pPr algn="l"/>
+            <a:r>
+              <a:rPr lang="en-US" sz="5600" dirty="0">
+                <a:solidFill>
+                  <a:schemeClr val="bg1"/>
+                </a:solidFill>
+              </a:rPr>
+              <a:t>Ansible</a:t>
+            </a:r>
+            <a:endParaRPr lang="ru-UA" sz="5600" dirty="0">
+              <a:solidFill>
+                <a:schemeClr val="bg1"/>
+              </a:solidFill>
+            </a:endParaRPr>
+          </a:p>
+        </p:txBody>
+      </p:sp>
+      <p:sp>
+        <p:nvSpPr>
+          <p:cNvPr id="11" name="Rectangle 10">
+            <a:extLst>
+              <a:ext uri="{FF2B5EF4-FFF2-40B4-BE49-F238E27FC236}">
+                <a16:creationId xmlns:a16="http://schemas.microsoft.com/office/drawing/2014/main" id="{B34F5AD2-EDBD-4BBD-A55C-EAFFD0C7097A}"/>
+              </a:ext>
+              <a:ext uri="{C183D7F6-B498-43B3-948B-1728B52AA6E4}">
+                <adec:decorative xmlns:adec="http://schemas.microsoft.com/office/drawing/2017/decorative" val="1"/>
+              </a:ext>
+            </a:extLst>
+          </p:cNvPr>
+          <p:cNvSpPr>
+            <a:spLocks noGrp="1" noRot="1" noChangeAspect="1" noMove="1" noResize="1" noEditPoints="1" noAdjustHandles="1" noChangeArrowheads="1" noChangeShapeType="1" noTextEdit="1"/>
+          </p:cNvSpPr>
+          <p:nvPr>
+            <p:extLst>
+              <p:ext uri="{386F3935-93C4-4BCD-93E2-E3B085C9AB24}">
+                <p16:designElem xmlns:p16="http://schemas.microsoft.com/office/powerpoint/2015/main" val="1"/>
+              </p:ext>
+            </p:extLst>
+          </p:nvPr>
+        </p:nvSpPr>
+        <p:spPr>
+          <a:xfrm>
+            <a:off x="6096000" y="0"/>
+            <a:ext cx="6095990" cy="6858001"/>
+          </a:xfrm>
+          <a:prstGeom prst="rect">
+            <a:avLst/>
+          </a:prstGeom>
+          <a:solidFill>
+            <a:schemeClr val="bg1">
+              <a:lumMod val="95000"/>
+            </a:schemeClr>
+          </a:solidFill>
+          <a:ln>
+            <a:noFill/>
+          </a:ln>
+        </p:spPr>
+        <p:style>
+          <a:lnRef idx="2">
+            <a:schemeClr val="accent1">
+              <a:shade val="50000"/>
+            </a:schemeClr>
+          </a:lnRef>
+          <a:fillRef idx="1">
+            <a:schemeClr val="accent1"/>
+          </a:fillRef>
+          <a:effectRef idx="0">
+            <a:schemeClr val="accent1"/>
+          </a:effectRef>
+          <a:fontRef idx="minor">
+            <a:schemeClr val="lt1"/>
+          </a:fontRef>
+        </p:style>
+        <p:txBody>
+          <a:bodyPr rtlCol="0" anchor="ctr"/>
+          <a:lstStyle/>
+          <a:p>
+            <a:pPr algn="ctr"/>
+            <a:endParaRPr lang="en-US"/>
+          </a:p>
+        </p:txBody>
+      </p:sp>
+      <p:sp>
+        <p:nvSpPr>
+          <p:cNvPr id="4" name="Footer Placeholder 3">
+            <a:extLst>
+              <a:ext uri="{FF2B5EF4-FFF2-40B4-BE49-F238E27FC236}">
+                <a16:creationId xmlns:a16="http://schemas.microsoft.com/office/drawing/2014/main" id="{C99D0D71-05C2-1881-DCFB-D99C1C10CBB8}"/>
+              </a:ext>
+            </a:extLst>
+          </p:cNvPr>
+          <p:cNvSpPr>
+            <a:spLocks noGrp="1"/>
+          </p:cNvSpPr>
+          <p:nvPr>
+            <p:ph type="ftr" sz="quarter" idx="11"/>
+          </p:nvPr>
+        </p:nvSpPr>
+        <p:spPr>
+          <a:xfrm rot="5400000">
+            <a:off x="-349845" y="5226028"/>
+            <a:ext cx="1663495" cy="313512"/>
+          </a:xfrm>
+        </p:spPr>
+        <p:txBody>
+          <a:bodyPr anchor="ctr">
+            <a:normAutofit/>
+          </a:bodyPr>
+          <a:lstStyle/>
+          <a:p>
+            <a:pPr algn="r">
+              <a:spcAft>
+                <a:spcPts val="600"/>
+              </a:spcAft>
+            </a:pPr>
+            <a:r>
+              <a:rPr lang="es-ES" sz="900">
+                <a:solidFill>
+                  <a:schemeClr val="bg1"/>
+                </a:solidFill>
+              </a:rPr>
+              <a:t>Step 1 - Model - ver. 1</a:t>
+            </a:r>
+            <a:endParaRPr lang="ru-UA" sz="900">
+              <a:solidFill>
+                <a:schemeClr val="bg1"/>
+              </a:solidFill>
+            </a:endParaRPr>
+          </a:p>
+        </p:txBody>
+      </p:sp>
+    </p:spTree>
+    <p:extLst>
+      <p:ext uri="{BB962C8B-B14F-4D97-AF65-F5344CB8AC3E}">
+        <p14:creationId xmlns:p14="http://schemas.microsoft.com/office/powerpoint/2010/main" val="2690505772"/>
+      </p:ext>
+    </p:extLst>
+  </p:cSld>
+  <p:clrMapOvr>
+    <a:masterClrMapping/>
+  </p:clrMapOvr>
+</p:sld>
+</file>
+
 <file path=ppt/slides/slide2.xml><?xml version="1.0" encoding="utf-8"?>
 <p:sld xmlns:a="http://schemas.openxmlformats.org/drawingml/2006/main" xmlns:r="http://schemas.openxmlformats.org/officeDocument/2006/relationships" xmlns:p="http://schemas.openxmlformats.org/presentationml/2006/main">
   <p:cSld>
@@ -14588,7 +14925,7 @@
             <p:ph idx="1"/>
             <p:extLst>
               <p:ext uri="{D42A27DB-BD31-4B8C-83A1-F6EECF244321}">
-                <p14:modId xmlns:p14="http://schemas.microsoft.com/office/powerpoint/2010/main" val="1793774275"/>
+                <p14:modId xmlns:p14="http://schemas.microsoft.com/office/powerpoint/2010/main" val="3158303876"/>
               </p:ext>
             </p:extLst>
           </p:nvPr>
@@ -14607,6 +14944,1318 @@
     <p:extLst>
       <p:ext uri="{BB962C8B-B14F-4D97-AF65-F5344CB8AC3E}">
         <p14:creationId xmlns:p14="http://schemas.microsoft.com/office/powerpoint/2010/main" val="2972731808"/>
+      </p:ext>
+    </p:extLst>
+  </p:cSld>
+  <p:clrMapOvr>
+    <a:masterClrMapping/>
+  </p:clrMapOvr>
+</p:sld>
+</file>
+
+<file path=ppt/slides/slide20.xml><?xml version="1.0" encoding="utf-8"?>
+<p:sld xmlns:a="http://schemas.openxmlformats.org/drawingml/2006/main" xmlns:r="http://schemas.openxmlformats.org/officeDocument/2006/relationships" xmlns:p="http://schemas.openxmlformats.org/presentationml/2006/main">
+  <p:cSld>
+    <p:bg>
+      <p:bgPr>
+        <a:solidFill>
+          <a:schemeClr val="bg1"/>
+        </a:solidFill>
+        <a:effectLst/>
+      </p:bgPr>
+    </p:bg>
+    <p:spTree>
+      <p:nvGrpSpPr>
+        <p:cNvPr id="1" name=""/>
+        <p:cNvGrpSpPr/>
+        <p:nvPr/>
+      </p:nvGrpSpPr>
+      <p:grpSpPr>
+        <a:xfrm>
+          <a:off x="0" y="0"/>
+          <a:ext cx="0" cy="0"/>
+          <a:chOff x="0" y="0"/>
+          <a:chExt cx="0" cy="0"/>
+        </a:xfrm>
+      </p:grpSpPr>
+      <p:sp>
+        <p:nvSpPr>
+          <p:cNvPr id="24" name="Down Arrow 7">
+            <a:extLst>
+              <a:ext uri="{FF2B5EF4-FFF2-40B4-BE49-F238E27FC236}">
+                <a16:creationId xmlns:a16="http://schemas.microsoft.com/office/drawing/2014/main" id="{D4771268-CB57-404A-9271-370EB28F6090}"/>
+              </a:ext>
+              <a:ext uri="{C183D7F6-B498-43B3-948B-1728B52AA6E4}">
+                <adec:decorative xmlns:adec="http://schemas.microsoft.com/office/drawing/2017/decorative" val="1"/>
+              </a:ext>
+            </a:extLst>
+          </p:cNvPr>
+          <p:cNvSpPr>
+            <a:spLocks noGrp="1" noRot="1" noChangeAspect="1" noMove="1" noResize="1" noEditPoints="1" noAdjustHandles="1" noChangeArrowheads="1" noChangeShapeType="1" noTextEdit="1"/>
+          </p:cNvSpPr>
+          <p:nvPr>
+            <p:extLst>
+              <p:ext uri="{386F3935-93C4-4BCD-93E2-E3B085C9AB24}">
+                <p16:designElem xmlns:p16="http://schemas.microsoft.com/office/powerpoint/2015/main" val="1"/>
+              </p:ext>
+            </p:extLst>
+          </p:nvPr>
+        </p:nvSpPr>
+        <p:spPr>
+          <a:xfrm rot="16200000">
+            <a:off x="800100" y="1491343"/>
+            <a:ext cx="3333749" cy="3499103"/>
+          </a:xfrm>
+          <a:prstGeom prst="downArrow">
+            <a:avLst>
+              <a:gd name="adj1" fmla="val 100000"/>
+              <a:gd name="adj2" fmla="val 15788"/>
+            </a:avLst>
+          </a:prstGeom>
+          <a:solidFill>
+            <a:srgbClr val="404040"/>
+          </a:solidFill>
+          <a:ln w="53975">
+            <a:noFill/>
+          </a:ln>
+        </p:spPr>
+        <p:style>
+          <a:lnRef idx="2">
+            <a:schemeClr val="accent1">
+              <a:shade val="50000"/>
+            </a:schemeClr>
+          </a:lnRef>
+          <a:fillRef idx="1">
+            <a:schemeClr val="accent1"/>
+          </a:fillRef>
+          <a:effectRef idx="0">
+            <a:schemeClr val="accent1"/>
+          </a:effectRef>
+          <a:fontRef idx="minor">
+            <a:schemeClr val="lt1"/>
+          </a:fontRef>
+        </p:style>
+        <p:txBody>
+          <a:bodyPr rtlCol="0" anchor="ctr"/>
+          <a:lstStyle/>
+          <a:p>
+            <a:pPr algn="ctr"/>
+            <a:endParaRPr lang="en-US"/>
+          </a:p>
+        </p:txBody>
+      </p:sp>
+      <p:sp>
+        <p:nvSpPr>
+          <p:cNvPr id="2" name="Title 1">
+            <a:extLst>
+              <a:ext uri="{FF2B5EF4-FFF2-40B4-BE49-F238E27FC236}">
+                <a16:creationId xmlns:a16="http://schemas.microsoft.com/office/drawing/2014/main" id="{53C5D828-9666-E312-B574-9FE965A7D6BE}"/>
+              </a:ext>
+            </a:extLst>
+          </p:cNvPr>
+          <p:cNvSpPr>
+            <a:spLocks noGrp="1"/>
+          </p:cNvSpPr>
+          <p:nvPr>
+            <p:ph type="title"/>
+          </p:nvPr>
+        </p:nvSpPr>
+        <p:spPr>
+          <a:xfrm>
+            <a:off x="889000" y="1967266"/>
+            <a:ext cx="2602345" cy="2547257"/>
+          </a:xfrm>
+          <a:noFill/>
+        </p:spPr>
+        <p:txBody>
+          <a:bodyPr vert="horz" lIns="91440" tIns="45720" rIns="91440" bIns="45720" rtlCol="0" anchor="ctr">
+            <a:normAutofit/>
+          </a:bodyPr>
+          <a:lstStyle/>
+          <a:p>
+            <a:pPr algn="ctr"/>
+            <a:r>
+              <a:rPr lang="en-US" sz="3600" dirty="0">
+                <a:solidFill>
+                  <a:srgbClr val="FFFFFF"/>
+                </a:solidFill>
+              </a:rPr>
+              <a:t>What Is Ansible?</a:t>
+            </a:r>
+            <a:endParaRPr lang="en-US" sz="3600" kern="1200" dirty="0">
+              <a:solidFill>
+                <a:srgbClr val="FFFFFF"/>
+              </a:solidFill>
+              <a:latin typeface="+mj-lt"/>
+              <a:ea typeface="+mj-ea"/>
+              <a:cs typeface="+mj-cs"/>
+            </a:endParaRPr>
+          </a:p>
+        </p:txBody>
+      </p:sp>
+      <p:sp>
+        <p:nvSpPr>
+          <p:cNvPr id="3" name="Footer Placeholder 2">
+            <a:extLst>
+              <a:ext uri="{FF2B5EF4-FFF2-40B4-BE49-F238E27FC236}">
+                <a16:creationId xmlns:a16="http://schemas.microsoft.com/office/drawing/2014/main" id="{5AA19FA0-A765-8169-03F1-928E3EF7B595}"/>
+              </a:ext>
+            </a:extLst>
+          </p:cNvPr>
+          <p:cNvSpPr>
+            <a:spLocks noGrp="1"/>
+          </p:cNvSpPr>
+          <p:nvPr>
+            <p:ph type="ftr" sz="quarter" idx="11"/>
+          </p:nvPr>
+        </p:nvSpPr>
+        <p:spPr/>
+        <p:txBody>
+          <a:bodyPr/>
+          <a:lstStyle/>
+          <a:p>
+            <a:r>
+              <a:rPr lang="es-ES"/>
+              <a:t>Step 1 - Model - ver. 1</a:t>
+            </a:r>
+            <a:endParaRPr lang="ru-UA"/>
+          </a:p>
+        </p:txBody>
+      </p:sp>
+      <p:pic>
+        <p:nvPicPr>
+          <p:cNvPr id="5" name="Picture 4">
+            <a:extLst>
+              <a:ext uri="{FF2B5EF4-FFF2-40B4-BE49-F238E27FC236}">
+                <a16:creationId xmlns:a16="http://schemas.microsoft.com/office/drawing/2014/main" id="{F532E8B4-0BE7-0CB3-9EF5-566DC21B1A9C}"/>
+              </a:ext>
+            </a:extLst>
+          </p:cNvPr>
+          <p:cNvPicPr>
+            <a:picLocks noChangeAspect="1"/>
+          </p:cNvPicPr>
+          <p:nvPr/>
+        </p:nvPicPr>
+        <p:blipFill>
+          <a:blip r:embed="rId2">
+            <a:duotone>
+              <a:schemeClr val="accent6">
+                <a:shade val="45000"/>
+                <a:satMod val="135000"/>
+              </a:schemeClr>
+              <a:prstClr val="white"/>
+            </a:duotone>
+          </a:blip>
+          <a:stretch>
+            <a:fillRect/>
+          </a:stretch>
+        </p:blipFill>
+        <p:spPr>
+          <a:xfrm>
+            <a:off x="5310187" y="697719"/>
+            <a:ext cx="5686425" cy="5086350"/>
+          </a:xfrm>
+          <a:prstGeom prst="rect">
+            <a:avLst/>
+          </a:prstGeom>
+        </p:spPr>
+      </p:pic>
+    </p:spTree>
+    <p:extLst>
+      <p:ext uri="{BB962C8B-B14F-4D97-AF65-F5344CB8AC3E}">
+        <p14:creationId xmlns:p14="http://schemas.microsoft.com/office/powerpoint/2010/main" val="3618741339"/>
+      </p:ext>
+    </p:extLst>
+  </p:cSld>
+  <p:clrMapOvr>
+    <a:masterClrMapping/>
+  </p:clrMapOvr>
+</p:sld>
+</file>
+
+<file path=ppt/slides/slide21.xml><?xml version="1.0" encoding="utf-8"?>
+<p:sld xmlns:a="http://schemas.openxmlformats.org/drawingml/2006/main" xmlns:r="http://schemas.openxmlformats.org/officeDocument/2006/relationships" xmlns:p="http://schemas.openxmlformats.org/presentationml/2006/main">
+  <p:cSld>
+    <p:bg>
+      <p:bgPr>
+        <a:solidFill>
+          <a:schemeClr val="bg1"/>
+        </a:solidFill>
+        <a:effectLst/>
+      </p:bgPr>
+    </p:bg>
+    <p:spTree>
+      <p:nvGrpSpPr>
+        <p:cNvPr id="1" name=""/>
+        <p:cNvGrpSpPr/>
+        <p:nvPr/>
+      </p:nvGrpSpPr>
+      <p:grpSpPr>
+        <a:xfrm>
+          <a:off x="0" y="0"/>
+          <a:ext cx="0" cy="0"/>
+          <a:chOff x="0" y="0"/>
+          <a:chExt cx="0" cy="0"/>
+        </a:xfrm>
+      </p:grpSpPr>
+      <p:sp>
+        <p:nvSpPr>
+          <p:cNvPr id="24" name="Down Arrow 7">
+            <a:extLst>
+              <a:ext uri="{FF2B5EF4-FFF2-40B4-BE49-F238E27FC236}">
+                <a16:creationId xmlns:a16="http://schemas.microsoft.com/office/drawing/2014/main" id="{D4771268-CB57-404A-9271-370EB28F6090}"/>
+              </a:ext>
+              <a:ext uri="{C183D7F6-B498-43B3-948B-1728B52AA6E4}">
+                <adec:decorative xmlns:adec="http://schemas.microsoft.com/office/drawing/2017/decorative" val="1"/>
+              </a:ext>
+            </a:extLst>
+          </p:cNvPr>
+          <p:cNvSpPr>
+            <a:spLocks noGrp="1" noRot="1" noChangeAspect="1" noMove="1" noResize="1" noEditPoints="1" noAdjustHandles="1" noChangeArrowheads="1" noChangeShapeType="1" noTextEdit="1"/>
+          </p:cNvSpPr>
+          <p:nvPr>
+            <p:extLst>
+              <p:ext uri="{386F3935-93C4-4BCD-93E2-E3B085C9AB24}">
+                <p16:designElem xmlns:p16="http://schemas.microsoft.com/office/powerpoint/2015/main" val="1"/>
+              </p:ext>
+            </p:extLst>
+          </p:nvPr>
+        </p:nvSpPr>
+        <p:spPr>
+          <a:xfrm rot="16200000">
+            <a:off x="800100" y="1491343"/>
+            <a:ext cx="3333749" cy="3499103"/>
+          </a:xfrm>
+          <a:prstGeom prst="downArrow">
+            <a:avLst>
+              <a:gd name="adj1" fmla="val 100000"/>
+              <a:gd name="adj2" fmla="val 15788"/>
+            </a:avLst>
+          </a:prstGeom>
+          <a:solidFill>
+            <a:srgbClr val="404040"/>
+          </a:solidFill>
+          <a:ln w="53975">
+            <a:noFill/>
+          </a:ln>
+        </p:spPr>
+        <p:style>
+          <a:lnRef idx="2">
+            <a:schemeClr val="accent1">
+              <a:shade val="50000"/>
+            </a:schemeClr>
+          </a:lnRef>
+          <a:fillRef idx="1">
+            <a:schemeClr val="accent1"/>
+          </a:fillRef>
+          <a:effectRef idx="0">
+            <a:schemeClr val="accent1"/>
+          </a:effectRef>
+          <a:fontRef idx="minor">
+            <a:schemeClr val="lt1"/>
+          </a:fontRef>
+        </p:style>
+        <p:txBody>
+          <a:bodyPr rtlCol="0" anchor="ctr"/>
+          <a:lstStyle/>
+          <a:p>
+            <a:pPr algn="ctr"/>
+            <a:endParaRPr lang="en-US"/>
+          </a:p>
+        </p:txBody>
+      </p:sp>
+      <p:sp>
+        <p:nvSpPr>
+          <p:cNvPr id="2" name="Title 1">
+            <a:extLst>
+              <a:ext uri="{FF2B5EF4-FFF2-40B4-BE49-F238E27FC236}">
+                <a16:creationId xmlns:a16="http://schemas.microsoft.com/office/drawing/2014/main" id="{53C5D828-9666-E312-B574-9FE965A7D6BE}"/>
+              </a:ext>
+            </a:extLst>
+          </p:cNvPr>
+          <p:cNvSpPr>
+            <a:spLocks noGrp="1"/>
+          </p:cNvSpPr>
+          <p:nvPr>
+            <p:ph type="title"/>
+          </p:nvPr>
+        </p:nvSpPr>
+        <p:spPr>
+          <a:xfrm>
+            <a:off x="889000" y="1967266"/>
+            <a:ext cx="2602345" cy="2547257"/>
+          </a:xfrm>
+          <a:noFill/>
+        </p:spPr>
+        <p:txBody>
+          <a:bodyPr vert="horz" lIns="91440" tIns="45720" rIns="91440" bIns="45720" rtlCol="0" anchor="ctr">
+            <a:normAutofit/>
+          </a:bodyPr>
+          <a:lstStyle/>
+          <a:p>
+            <a:pPr algn="ctr"/>
+            <a:r>
+              <a:rPr lang="en-US" sz="3600" dirty="0">
+                <a:solidFill>
+                  <a:srgbClr val="FFFFFF"/>
+                </a:solidFill>
+              </a:rPr>
+              <a:t>Ansible Architecture</a:t>
+            </a:r>
+            <a:endParaRPr lang="en-US" sz="3600" kern="1200" dirty="0">
+              <a:solidFill>
+                <a:srgbClr val="FFFFFF"/>
+              </a:solidFill>
+              <a:latin typeface="+mj-lt"/>
+              <a:ea typeface="+mj-ea"/>
+              <a:cs typeface="+mj-cs"/>
+            </a:endParaRPr>
+          </a:p>
+        </p:txBody>
+      </p:sp>
+      <p:sp>
+        <p:nvSpPr>
+          <p:cNvPr id="3" name="Footer Placeholder 2">
+            <a:extLst>
+              <a:ext uri="{FF2B5EF4-FFF2-40B4-BE49-F238E27FC236}">
+                <a16:creationId xmlns:a16="http://schemas.microsoft.com/office/drawing/2014/main" id="{5AA19FA0-A765-8169-03F1-928E3EF7B595}"/>
+              </a:ext>
+            </a:extLst>
+          </p:cNvPr>
+          <p:cNvSpPr>
+            <a:spLocks noGrp="1"/>
+          </p:cNvSpPr>
+          <p:nvPr>
+            <p:ph type="ftr" sz="quarter" idx="11"/>
+          </p:nvPr>
+        </p:nvSpPr>
+        <p:spPr/>
+        <p:txBody>
+          <a:bodyPr/>
+          <a:lstStyle/>
+          <a:p>
+            <a:r>
+              <a:rPr lang="es-ES"/>
+              <a:t>Step 1 - Model - ver. 1</a:t>
+            </a:r>
+            <a:endParaRPr lang="ru-UA"/>
+          </a:p>
+        </p:txBody>
+      </p:sp>
+      <p:pic>
+        <p:nvPicPr>
+          <p:cNvPr id="4" name="Picture 3">
+            <a:extLst>
+              <a:ext uri="{FF2B5EF4-FFF2-40B4-BE49-F238E27FC236}">
+                <a16:creationId xmlns:a16="http://schemas.microsoft.com/office/drawing/2014/main" id="{28A2D3FD-7D05-8035-871B-BC18824DA49F}"/>
+              </a:ext>
+            </a:extLst>
+          </p:cNvPr>
+          <p:cNvPicPr>
+            <a:picLocks noChangeAspect="1"/>
+          </p:cNvPicPr>
+          <p:nvPr/>
+        </p:nvPicPr>
+        <p:blipFill>
+          <a:blip r:embed="rId2"/>
+          <a:stretch>
+            <a:fillRect/>
+          </a:stretch>
+        </p:blipFill>
+        <p:spPr>
+          <a:xfrm>
+            <a:off x="4343400" y="1483964"/>
+            <a:ext cx="7620000" cy="3810000"/>
+          </a:xfrm>
+          <a:prstGeom prst="rect">
+            <a:avLst/>
+          </a:prstGeom>
+        </p:spPr>
+      </p:pic>
+    </p:spTree>
+    <p:extLst>
+      <p:ext uri="{BB962C8B-B14F-4D97-AF65-F5344CB8AC3E}">
+        <p14:creationId xmlns:p14="http://schemas.microsoft.com/office/powerpoint/2010/main" val="955539517"/>
+      </p:ext>
+    </p:extLst>
+  </p:cSld>
+  <p:clrMapOvr>
+    <a:masterClrMapping/>
+  </p:clrMapOvr>
+</p:sld>
+</file>
+
+<file path=ppt/slides/slide22.xml><?xml version="1.0" encoding="utf-8"?>
+<p:sld xmlns:a="http://schemas.openxmlformats.org/drawingml/2006/main" xmlns:r="http://schemas.openxmlformats.org/officeDocument/2006/relationships" xmlns:p="http://schemas.openxmlformats.org/presentationml/2006/main">
+  <p:cSld>
+    <p:bg>
+      <p:bgPr>
+        <a:solidFill>
+          <a:schemeClr val="bg1"/>
+        </a:solidFill>
+        <a:effectLst/>
+      </p:bgPr>
+    </p:bg>
+    <p:spTree>
+      <p:nvGrpSpPr>
+        <p:cNvPr id="1" name=""/>
+        <p:cNvGrpSpPr/>
+        <p:nvPr/>
+      </p:nvGrpSpPr>
+      <p:grpSpPr>
+        <a:xfrm>
+          <a:off x="0" y="0"/>
+          <a:ext cx="0" cy="0"/>
+          <a:chOff x="0" y="0"/>
+          <a:chExt cx="0" cy="0"/>
+        </a:xfrm>
+      </p:grpSpPr>
+      <p:sp>
+        <p:nvSpPr>
+          <p:cNvPr id="24" name="Down Arrow 7">
+            <a:extLst>
+              <a:ext uri="{FF2B5EF4-FFF2-40B4-BE49-F238E27FC236}">
+                <a16:creationId xmlns:a16="http://schemas.microsoft.com/office/drawing/2014/main" id="{D4771268-CB57-404A-9271-370EB28F6090}"/>
+              </a:ext>
+              <a:ext uri="{C183D7F6-B498-43B3-948B-1728B52AA6E4}">
+                <adec:decorative xmlns:adec="http://schemas.microsoft.com/office/drawing/2017/decorative" val="1"/>
+              </a:ext>
+            </a:extLst>
+          </p:cNvPr>
+          <p:cNvSpPr>
+            <a:spLocks noGrp="1" noRot="1" noChangeAspect="1" noMove="1" noResize="1" noEditPoints="1" noAdjustHandles="1" noChangeArrowheads="1" noChangeShapeType="1" noTextEdit="1"/>
+          </p:cNvSpPr>
+          <p:nvPr>
+            <p:extLst>
+              <p:ext uri="{386F3935-93C4-4BCD-93E2-E3B085C9AB24}">
+                <p16:designElem xmlns:p16="http://schemas.microsoft.com/office/powerpoint/2015/main" val="1"/>
+              </p:ext>
+            </p:extLst>
+          </p:nvPr>
+        </p:nvSpPr>
+        <p:spPr>
+          <a:xfrm rot="16200000">
+            <a:off x="800100" y="1491343"/>
+            <a:ext cx="3333749" cy="3499103"/>
+          </a:xfrm>
+          <a:prstGeom prst="downArrow">
+            <a:avLst>
+              <a:gd name="adj1" fmla="val 100000"/>
+              <a:gd name="adj2" fmla="val 15788"/>
+            </a:avLst>
+          </a:prstGeom>
+          <a:solidFill>
+            <a:srgbClr val="404040"/>
+          </a:solidFill>
+          <a:ln w="53975">
+            <a:noFill/>
+          </a:ln>
+        </p:spPr>
+        <p:style>
+          <a:lnRef idx="2">
+            <a:schemeClr val="accent1">
+              <a:shade val="50000"/>
+            </a:schemeClr>
+          </a:lnRef>
+          <a:fillRef idx="1">
+            <a:schemeClr val="accent1"/>
+          </a:fillRef>
+          <a:effectRef idx="0">
+            <a:schemeClr val="accent1"/>
+          </a:effectRef>
+          <a:fontRef idx="minor">
+            <a:schemeClr val="lt1"/>
+          </a:fontRef>
+        </p:style>
+        <p:txBody>
+          <a:bodyPr rtlCol="0" anchor="ctr"/>
+          <a:lstStyle/>
+          <a:p>
+            <a:pPr algn="ctr"/>
+            <a:endParaRPr lang="en-US"/>
+          </a:p>
+        </p:txBody>
+      </p:sp>
+      <p:sp>
+        <p:nvSpPr>
+          <p:cNvPr id="2" name="Title 1">
+            <a:extLst>
+              <a:ext uri="{FF2B5EF4-FFF2-40B4-BE49-F238E27FC236}">
+                <a16:creationId xmlns:a16="http://schemas.microsoft.com/office/drawing/2014/main" id="{53C5D828-9666-E312-B574-9FE965A7D6BE}"/>
+              </a:ext>
+            </a:extLst>
+          </p:cNvPr>
+          <p:cNvSpPr>
+            <a:spLocks noGrp="1"/>
+          </p:cNvSpPr>
+          <p:nvPr>
+            <p:ph type="title"/>
+          </p:nvPr>
+        </p:nvSpPr>
+        <p:spPr>
+          <a:xfrm>
+            <a:off x="889000" y="1967266"/>
+            <a:ext cx="2602345" cy="2547257"/>
+          </a:xfrm>
+          <a:noFill/>
+        </p:spPr>
+        <p:txBody>
+          <a:bodyPr vert="horz" lIns="91440" tIns="45720" rIns="91440" bIns="45720" rtlCol="0" anchor="ctr">
+            <a:normAutofit/>
+          </a:bodyPr>
+          <a:lstStyle/>
+          <a:p>
+            <a:pPr algn="ctr"/>
+            <a:r>
+              <a:rPr lang="en-US" sz="3600" dirty="0">
+                <a:solidFill>
+                  <a:srgbClr val="FFFFFF"/>
+                </a:solidFill>
+              </a:rPr>
+              <a:t>Ansible - Building an inventory</a:t>
+            </a:r>
+            <a:endParaRPr lang="en-US" sz="3600" kern="1200" dirty="0">
+              <a:solidFill>
+                <a:srgbClr val="FFFFFF"/>
+              </a:solidFill>
+              <a:latin typeface="+mj-lt"/>
+              <a:ea typeface="+mj-ea"/>
+              <a:cs typeface="+mj-cs"/>
+            </a:endParaRPr>
+          </a:p>
+        </p:txBody>
+      </p:sp>
+      <p:sp>
+        <p:nvSpPr>
+          <p:cNvPr id="3" name="Footer Placeholder 2">
+            <a:extLst>
+              <a:ext uri="{FF2B5EF4-FFF2-40B4-BE49-F238E27FC236}">
+                <a16:creationId xmlns:a16="http://schemas.microsoft.com/office/drawing/2014/main" id="{5AA19FA0-A765-8169-03F1-928E3EF7B595}"/>
+              </a:ext>
+            </a:extLst>
+          </p:cNvPr>
+          <p:cNvSpPr>
+            <a:spLocks noGrp="1"/>
+          </p:cNvSpPr>
+          <p:nvPr>
+            <p:ph type="ftr" sz="quarter" idx="11"/>
+          </p:nvPr>
+        </p:nvSpPr>
+        <p:spPr/>
+        <p:txBody>
+          <a:bodyPr/>
+          <a:lstStyle/>
+          <a:p>
+            <a:r>
+              <a:rPr lang="es-ES"/>
+              <a:t>Step 1 - Model - ver. 1</a:t>
+            </a:r>
+            <a:endParaRPr lang="ru-UA"/>
+          </a:p>
+        </p:txBody>
+      </p:sp>
+      <p:pic>
+        <p:nvPicPr>
+          <p:cNvPr id="6" name="Picture 5">
+            <a:extLst>
+              <a:ext uri="{FF2B5EF4-FFF2-40B4-BE49-F238E27FC236}">
+                <a16:creationId xmlns:a16="http://schemas.microsoft.com/office/drawing/2014/main" id="{B6424C26-77F8-976F-095A-C034C68F13F1}"/>
+              </a:ext>
+            </a:extLst>
+          </p:cNvPr>
+          <p:cNvPicPr>
+            <a:picLocks noChangeAspect="1"/>
+          </p:cNvPicPr>
+          <p:nvPr/>
+        </p:nvPicPr>
+        <p:blipFill>
+          <a:blip r:embed="rId2"/>
+          <a:stretch>
+            <a:fillRect/>
+          </a:stretch>
+        </p:blipFill>
+        <p:spPr>
+          <a:xfrm>
+            <a:off x="5540735" y="1967266"/>
+            <a:ext cx="5570610" cy="2682779"/>
+          </a:xfrm>
+          <a:prstGeom prst="rect">
+            <a:avLst/>
+          </a:prstGeom>
+        </p:spPr>
+      </p:pic>
+    </p:spTree>
+    <p:extLst>
+      <p:ext uri="{BB962C8B-B14F-4D97-AF65-F5344CB8AC3E}">
+        <p14:creationId xmlns:p14="http://schemas.microsoft.com/office/powerpoint/2010/main" val="3974958853"/>
+      </p:ext>
+    </p:extLst>
+  </p:cSld>
+  <p:clrMapOvr>
+    <a:masterClrMapping/>
+  </p:clrMapOvr>
+</p:sld>
+</file>
+
+<file path=ppt/slides/slide23.xml><?xml version="1.0" encoding="utf-8"?>
+<p:sld xmlns:a="http://schemas.openxmlformats.org/drawingml/2006/main" xmlns:r="http://schemas.openxmlformats.org/officeDocument/2006/relationships" xmlns:p="http://schemas.openxmlformats.org/presentationml/2006/main">
+  <p:cSld>
+    <p:bg>
+      <p:bgPr>
+        <a:solidFill>
+          <a:schemeClr val="bg1"/>
+        </a:solidFill>
+        <a:effectLst/>
+      </p:bgPr>
+    </p:bg>
+    <p:spTree>
+      <p:nvGrpSpPr>
+        <p:cNvPr id="1" name=""/>
+        <p:cNvGrpSpPr/>
+        <p:nvPr/>
+      </p:nvGrpSpPr>
+      <p:grpSpPr>
+        <a:xfrm>
+          <a:off x="0" y="0"/>
+          <a:ext cx="0" cy="0"/>
+          <a:chOff x="0" y="0"/>
+          <a:chExt cx="0" cy="0"/>
+        </a:xfrm>
+      </p:grpSpPr>
+      <p:sp>
+        <p:nvSpPr>
+          <p:cNvPr id="24" name="Down Arrow 7">
+            <a:extLst>
+              <a:ext uri="{FF2B5EF4-FFF2-40B4-BE49-F238E27FC236}">
+                <a16:creationId xmlns:a16="http://schemas.microsoft.com/office/drawing/2014/main" id="{D4771268-CB57-404A-9271-370EB28F6090}"/>
+              </a:ext>
+              <a:ext uri="{C183D7F6-B498-43B3-948B-1728B52AA6E4}">
+                <adec:decorative xmlns:adec="http://schemas.microsoft.com/office/drawing/2017/decorative" val="1"/>
+              </a:ext>
+            </a:extLst>
+          </p:cNvPr>
+          <p:cNvSpPr>
+            <a:spLocks noGrp="1" noRot="1" noChangeAspect="1" noMove="1" noResize="1" noEditPoints="1" noAdjustHandles="1" noChangeArrowheads="1" noChangeShapeType="1" noTextEdit="1"/>
+          </p:cNvSpPr>
+          <p:nvPr>
+            <p:extLst>
+              <p:ext uri="{386F3935-93C4-4BCD-93E2-E3B085C9AB24}">
+                <p16:designElem xmlns:p16="http://schemas.microsoft.com/office/powerpoint/2015/main" val="1"/>
+              </p:ext>
+            </p:extLst>
+          </p:nvPr>
+        </p:nvSpPr>
+        <p:spPr>
+          <a:xfrm rot="16200000">
+            <a:off x="800100" y="1491343"/>
+            <a:ext cx="3333749" cy="3499103"/>
+          </a:xfrm>
+          <a:prstGeom prst="downArrow">
+            <a:avLst>
+              <a:gd name="adj1" fmla="val 100000"/>
+              <a:gd name="adj2" fmla="val 15788"/>
+            </a:avLst>
+          </a:prstGeom>
+          <a:solidFill>
+            <a:srgbClr val="404040"/>
+          </a:solidFill>
+          <a:ln w="53975">
+            <a:noFill/>
+          </a:ln>
+        </p:spPr>
+        <p:style>
+          <a:lnRef idx="2">
+            <a:schemeClr val="accent1">
+              <a:shade val="50000"/>
+            </a:schemeClr>
+          </a:lnRef>
+          <a:fillRef idx="1">
+            <a:schemeClr val="accent1"/>
+          </a:fillRef>
+          <a:effectRef idx="0">
+            <a:schemeClr val="accent1"/>
+          </a:effectRef>
+          <a:fontRef idx="minor">
+            <a:schemeClr val="lt1"/>
+          </a:fontRef>
+        </p:style>
+        <p:txBody>
+          <a:bodyPr rtlCol="0" anchor="ctr"/>
+          <a:lstStyle/>
+          <a:p>
+            <a:pPr algn="ctr"/>
+            <a:endParaRPr lang="en-US"/>
+          </a:p>
+        </p:txBody>
+      </p:sp>
+      <p:sp>
+        <p:nvSpPr>
+          <p:cNvPr id="2" name="Title 1">
+            <a:extLst>
+              <a:ext uri="{FF2B5EF4-FFF2-40B4-BE49-F238E27FC236}">
+                <a16:creationId xmlns:a16="http://schemas.microsoft.com/office/drawing/2014/main" id="{53C5D828-9666-E312-B574-9FE965A7D6BE}"/>
+              </a:ext>
+            </a:extLst>
+          </p:cNvPr>
+          <p:cNvSpPr>
+            <a:spLocks noGrp="1"/>
+          </p:cNvSpPr>
+          <p:nvPr>
+            <p:ph type="title"/>
+          </p:nvPr>
+        </p:nvSpPr>
+        <p:spPr>
+          <a:xfrm>
+            <a:off x="889000" y="1967266"/>
+            <a:ext cx="2602345" cy="2547257"/>
+          </a:xfrm>
+          <a:noFill/>
+        </p:spPr>
+        <p:txBody>
+          <a:bodyPr vert="horz" lIns="91440" tIns="45720" rIns="91440" bIns="45720" rtlCol="0" anchor="ctr">
+            <a:normAutofit/>
+          </a:bodyPr>
+          <a:lstStyle/>
+          <a:p>
+            <a:pPr algn="ctr"/>
+            <a:r>
+              <a:rPr lang="en-US" sz="3600" dirty="0">
+                <a:solidFill>
+                  <a:srgbClr val="FFFFFF"/>
+                </a:solidFill>
+              </a:rPr>
+              <a:t>Ansible - Creating a playbook</a:t>
+            </a:r>
+            <a:endParaRPr lang="en-US" sz="3600" kern="1200" dirty="0">
+              <a:solidFill>
+                <a:srgbClr val="FFFFFF"/>
+              </a:solidFill>
+              <a:latin typeface="+mj-lt"/>
+              <a:ea typeface="+mj-ea"/>
+              <a:cs typeface="+mj-cs"/>
+            </a:endParaRPr>
+          </a:p>
+        </p:txBody>
+      </p:sp>
+      <p:sp>
+        <p:nvSpPr>
+          <p:cNvPr id="3" name="Footer Placeholder 2">
+            <a:extLst>
+              <a:ext uri="{FF2B5EF4-FFF2-40B4-BE49-F238E27FC236}">
+                <a16:creationId xmlns:a16="http://schemas.microsoft.com/office/drawing/2014/main" id="{5AA19FA0-A765-8169-03F1-928E3EF7B595}"/>
+              </a:ext>
+            </a:extLst>
+          </p:cNvPr>
+          <p:cNvSpPr>
+            <a:spLocks noGrp="1"/>
+          </p:cNvSpPr>
+          <p:nvPr>
+            <p:ph type="ftr" sz="quarter" idx="11"/>
+          </p:nvPr>
+        </p:nvSpPr>
+        <p:spPr/>
+        <p:txBody>
+          <a:bodyPr/>
+          <a:lstStyle/>
+          <a:p>
+            <a:r>
+              <a:rPr lang="es-ES"/>
+              <a:t>Step 1 - Model - ver. 1</a:t>
+            </a:r>
+            <a:endParaRPr lang="ru-UA"/>
+          </a:p>
+        </p:txBody>
+      </p:sp>
+      <p:pic>
+        <p:nvPicPr>
+          <p:cNvPr id="5" name="Picture 4">
+            <a:extLst>
+              <a:ext uri="{FF2B5EF4-FFF2-40B4-BE49-F238E27FC236}">
+                <a16:creationId xmlns:a16="http://schemas.microsoft.com/office/drawing/2014/main" id="{79E04EF6-B44B-E770-0D59-0AE9905B0613}"/>
+              </a:ext>
+            </a:extLst>
+          </p:cNvPr>
+          <p:cNvPicPr>
+            <a:picLocks noChangeAspect="1"/>
+          </p:cNvPicPr>
+          <p:nvPr/>
+        </p:nvPicPr>
+        <p:blipFill>
+          <a:blip r:embed="rId2"/>
+          <a:stretch>
+            <a:fillRect/>
+          </a:stretch>
+        </p:blipFill>
+        <p:spPr>
+          <a:xfrm>
+            <a:off x="5401230" y="1861154"/>
+            <a:ext cx="5504340" cy="3403745"/>
+          </a:xfrm>
+          <a:prstGeom prst="rect">
+            <a:avLst/>
+          </a:prstGeom>
+        </p:spPr>
+      </p:pic>
+    </p:spTree>
+    <p:extLst>
+      <p:ext uri="{BB962C8B-B14F-4D97-AF65-F5344CB8AC3E}">
+        <p14:creationId xmlns:p14="http://schemas.microsoft.com/office/powerpoint/2010/main" val="3021423085"/>
+      </p:ext>
+    </p:extLst>
+  </p:cSld>
+  <p:clrMapOvr>
+    <a:masterClrMapping/>
+  </p:clrMapOvr>
+</p:sld>
+</file>
+
+<file path=ppt/slides/slide24.xml><?xml version="1.0" encoding="utf-8"?>
+<p:sld xmlns:a="http://schemas.openxmlformats.org/drawingml/2006/main" xmlns:r="http://schemas.openxmlformats.org/officeDocument/2006/relationships" xmlns:p="http://schemas.openxmlformats.org/presentationml/2006/main">
+  <p:cSld>
+    <p:bg>
+      <p:bgPr>
+        <a:solidFill>
+          <a:schemeClr val="bg1"/>
+        </a:solidFill>
+        <a:effectLst/>
+      </p:bgPr>
+    </p:bg>
+    <p:spTree>
+      <p:nvGrpSpPr>
+        <p:cNvPr id="1" name=""/>
+        <p:cNvGrpSpPr/>
+        <p:nvPr/>
+      </p:nvGrpSpPr>
+      <p:grpSpPr>
+        <a:xfrm>
+          <a:off x="0" y="0"/>
+          <a:ext cx="0" cy="0"/>
+          <a:chOff x="0" y="0"/>
+          <a:chExt cx="0" cy="0"/>
+        </a:xfrm>
+      </p:grpSpPr>
+      <p:sp>
+        <p:nvSpPr>
+          <p:cNvPr id="24" name="Down Arrow 7">
+            <a:extLst>
+              <a:ext uri="{FF2B5EF4-FFF2-40B4-BE49-F238E27FC236}">
+                <a16:creationId xmlns:a16="http://schemas.microsoft.com/office/drawing/2014/main" id="{D4771268-CB57-404A-9271-370EB28F6090}"/>
+              </a:ext>
+              <a:ext uri="{C183D7F6-B498-43B3-948B-1728B52AA6E4}">
+                <adec:decorative xmlns:adec="http://schemas.microsoft.com/office/drawing/2017/decorative" val="1"/>
+              </a:ext>
+            </a:extLst>
+          </p:cNvPr>
+          <p:cNvSpPr>
+            <a:spLocks noGrp="1" noRot="1" noChangeAspect="1" noMove="1" noResize="1" noEditPoints="1" noAdjustHandles="1" noChangeArrowheads="1" noChangeShapeType="1" noTextEdit="1"/>
+          </p:cNvSpPr>
+          <p:nvPr>
+            <p:extLst>
+              <p:ext uri="{386F3935-93C4-4BCD-93E2-E3B085C9AB24}">
+                <p16:designElem xmlns:p16="http://schemas.microsoft.com/office/powerpoint/2015/main" val="1"/>
+              </p:ext>
+            </p:extLst>
+          </p:nvPr>
+        </p:nvSpPr>
+        <p:spPr>
+          <a:xfrm rot="16200000">
+            <a:off x="800100" y="1491343"/>
+            <a:ext cx="3333749" cy="3499103"/>
+          </a:xfrm>
+          <a:prstGeom prst="downArrow">
+            <a:avLst>
+              <a:gd name="adj1" fmla="val 100000"/>
+              <a:gd name="adj2" fmla="val 15788"/>
+            </a:avLst>
+          </a:prstGeom>
+          <a:solidFill>
+            <a:srgbClr val="404040"/>
+          </a:solidFill>
+          <a:ln w="53975">
+            <a:noFill/>
+          </a:ln>
+        </p:spPr>
+        <p:style>
+          <a:lnRef idx="2">
+            <a:schemeClr val="accent1">
+              <a:shade val="50000"/>
+            </a:schemeClr>
+          </a:lnRef>
+          <a:fillRef idx="1">
+            <a:schemeClr val="accent1"/>
+          </a:fillRef>
+          <a:effectRef idx="0">
+            <a:schemeClr val="accent1"/>
+          </a:effectRef>
+          <a:fontRef idx="minor">
+            <a:schemeClr val="lt1"/>
+          </a:fontRef>
+        </p:style>
+        <p:txBody>
+          <a:bodyPr rtlCol="0" anchor="ctr"/>
+          <a:lstStyle/>
+          <a:p>
+            <a:pPr algn="ctr"/>
+            <a:endParaRPr lang="en-US"/>
+          </a:p>
+        </p:txBody>
+      </p:sp>
+      <p:sp>
+        <p:nvSpPr>
+          <p:cNvPr id="2" name="Title 1">
+            <a:extLst>
+              <a:ext uri="{FF2B5EF4-FFF2-40B4-BE49-F238E27FC236}">
+                <a16:creationId xmlns:a16="http://schemas.microsoft.com/office/drawing/2014/main" id="{53C5D828-9666-E312-B574-9FE965A7D6BE}"/>
+              </a:ext>
+            </a:extLst>
+          </p:cNvPr>
+          <p:cNvSpPr>
+            <a:spLocks noGrp="1"/>
+          </p:cNvSpPr>
+          <p:nvPr>
+            <p:ph type="title"/>
+          </p:nvPr>
+        </p:nvSpPr>
+        <p:spPr>
+          <a:xfrm>
+            <a:off x="889000" y="1967266"/>
+            <a:ext cx="2602345" cy="2547257"/>
+          </a:xfrm>
+          <a:noFill/>
+        </p:spPr>
+        <p:txBody>
+          <a:bodyPr vert="horz" lIns="91440" tIns="45720" rIns="91440" bIns="45720" rtlCol="0" anchor="ctr">
+            <a:normAutofit/>
+          </a:bodyPr>
+          <a:lstStyle/>
+          <a:p>
+            <a:pPr algn="ctr"/>
+            <a:r>
+              <a:rPr lang="en-US" sz="3600" dirty="0">
+                <a:solidFill>
+                  <a:srgbClr val="FFFFFF"/>
+                </a:solidFill>
+              </a:rPr>
+              <a:t>Ansible Roles</a:t>
+            </a:r>
+            <a:endParaRPr lang="en-US" sz="3600" kern="1200" dirty="0">
+              <a:solidFill>
+                <a:srgbClr val="FFFFFF"/>
+              </a:solidFill>
+              <a:latin typeface="+mj-lt"/>
+              <a:ea typeface="+mj-ea"/>
+              <a:cs typeface="+mj-cs"/>
+            </a:endParaRPr>
+          </a:p>
+        </p:txBody>
+      </p:sp>
+      <p:sp>
+        <p:nvSpPr>
+          <p:cNvPr id="3" name="Footer Placeholder 2">
+            <a:extLst>
+              <a:ext uri="{FF2B5EF4-FFF2-40B4-BE49-F238E27FC236}">
+                <a16:creationId xmlns:a16="http://schemas.microsoft.com/office/drawing/2014/main" id="{5AA19FA0-A765-8169-03F1-928E3EF7B595}"/>
+              </a:ext>
+            </a:extLst>
+          </p:cNvPr>
+          <p:cNvSpPr>
+            <a:spLocks noGrp="1"/>
+          </p:cNvSpPr>
+          <p:nvPr>
+            <p:ph type="ftr" sz="quarter" idx="11"/>
+          </p:nvPr>
+        </p:nvSpPr>
+        <p:spPr/>
+        <p:txBody>
+          <a:bodyPr/>
+          <a:lstStyle/>
+          <a:p>
+            <a:r>
+              <a:rPr lang="es-ES"/>
+              <a:t>Step 1 - Model - ver. 1</a:t>
+            </a:r>
+            <a:endParaRPr lang="ru-UA"/>
+          </a:p>
+        </p:txBody>
+      </p:sp>
+      <p:sp>
+        <p:nvSpPr>
+          <p:cNvPr id="4" name="Rectangle 3">
+            <a:extLst>
+              <a:ext uri="{FF2B5EF4-FFF2-40B4-BE49-F238E27FC236}">
+                <a16:creationId xmlns:a16="http://schemas.microsoft.com/office/drawing/2014/main" id="{03542100-9D21-41B2-EBC8-F5312B69ACDA}"/>
+              </a:ext>
+            </a:extLst>
+          </p:cNvPr>
+          <p:cNvSpPr/>
+          <p:nvPr/>
+        </p:nvSpPr>
+        <p:spPr>
+          <a:xfrm>
+            <a:off x="5777345" y="1967266"/>
+            <a:ext cx="5084619" cy="2940503"/>
+          </a:xfrm>
+          <a:prstGeom prst="rect">
+            <a:avLst/>
+          </a:prstGeom>
+        </p:spPr>
+        <p:style>
+          <a:lnRef idx="2">
+            <a:schemeClr val="accent1">
+              <a:shade val="15000"/>
+            </a:schemeClr>
+          </a:lnRef>
+          <a:fillRef idx="1">
+            <a:schemeClr val="accent1"/>
+          </a:fillRef>
+          <a:effectRef idx="0">
+            <a:schemeClr val="accent1"/>
+          </a:effectRef>
+          <a:fontRef idx="minor">
+            <a:schemeClr val="lt1"/>
+          </a:fontRef>
+        </p:style>
+        <p:txBody>
+          <a:bodyPr rtlCol="0" anchor="ctr"/>
+          <a:lstStyle/>
+          <a:p>
+            <a:pPr algn="ctr"/>
+            <a:endParaRPr lang="ru-UA"/>
+          </a:p>
+        </p:txBody>
+      </p:sp>
+    </p:spTree>
+    <p:extLst>
+      <p:ext uri="{BB962C8B-B14F-4D97-AF65-F5344CB8AC3E}">
+        <p14:creationId xmlns:p14="http://schemas.microsoft.com/office/powerpoint/2010/main" val="816537371"/>
+      </p:ext>
+    </p:extLst>
+  </p:cSld>
+  <p:clrMapOvr>
+    <a:masterClrMapping/>
+  </p:clrMapOvr>
+</p:sld>
+</file>
+
+<file path=ppt/slides/slide25.xml><?xml version="1.0" encoding="utf-8"?>
+<p:sld xmlns:a="http://schemas.openxmlformats.org/drawingml/2006/main" xmlns:r="http://schemas.openxmlformats.org/officeDocument/2006/relationships" xmlns:p="http://schemas.openxmlformats.org/presentationml/2006/main">
+  <p:cSld>
+    <p:bg>
+      <p:bgPr>
+        <a:solidFill>
+          <a:schemeClr val="bg1"/>
+        </a:solidFill>
+        <a:effectLst/>
+      </p:bgPr>
+    </p:bg>
+    <p:spTree>
+      <p:nvGrpSpPr>
+        <p:cNvPr id="1" name=""/>
+        <p:cNvGrpSpPr/>
+        <p:nvPr/>
+      </p:nvGrpSpPr>
+      <p:grpSpPr>
+        <a:xfrm>
+          <a:off x="0" y="0"/>
+          <a:ext cx="0" cy="0"/>
+          <a:chOff x="0" y="0"/>
+          <a:chExt cx="0" cy="0"/>
+        </a:xfrm>
+      </p:grpSpPr>
+      <p:sp>
+        <p:nvSpPr>
+          <p:cNvPr id="24" name="Down Arrow 7">
+            <a:extLst>
+              <a:ext uri="{FF2B5EF4-FFF2-40B4-BE49-F238E27FC236}">
+                <a16:creationId xmlns:a16="http://schemas.microsoft.com/office/drawing/2014/main" id="{D4771268-CB57-404A-9271-370EB28F6090}"/>
+              </a:ext>
+              <a:ext uri="{C183D7F6-B498-43B3-948B-1728B52AA6E4}">
+                <adec:decorative xmlns:adec="http://schemas.microsoft.com/office/drawing/2017/decorative" val="1"/>
+              </a:ext>
+            </a:extLst>
+          </p:cNvPr>
+          <p:cNvSpPr>
+            <a:spLocks noGrp="1" noRot="1" noChangeAspect="1" noMove="1" noResize="1" noEditPoints="1" noAdjustHandles="1" noChangeArrowheads="1" noChangeShapeType="1" noTextEdit="1"/>
+          </p:cNvSpPr>
+          <p:nvPr>
+            <p:extLst>
+              <p:ext uri="{386F3935-93C4-4BCD-93E2-E3B085C9AB24}">
+                <p16:designElem xmlns:p16="http://schemas.microsoft.com/office/powerpoint/2015/main" val="1"/>
+              </p:ext>
+            </p:extLst>
+          </p:nvPr>
+        </p:nvSpPr>
+        <p:spPr>
+          <a:xfrm rot="16200000">
+            <a:off x="800100" y="1491343"/>
+            <a:ext cx="3333749" cy="3499103"/>
+          </a:xfrm>
+          <a:prstGeom prst="downArrow">
+            <a:avLst>
+              <a:gd name="adj1" fmla="val 100000"/>
+              <a:gd name="adj2" fmla="val 15788"/>
+            </a:avLst>
+          </a:prstGeom>
+          <a:solidFill>
+            <a:srgbClr val="404040"/>
+          </a:solidFill>
+          <a:ln w="53975">
+            <a:noFill/>
+          </a:ln>
+        </p:spPr>
+        <p:style>
+          <a:lnRef idx="2">
+            <a:schemeClr val="accent1">
+              <a:shade val="50000"/>
+            </a:schemeClr>
+          </a:lnRef>
+          <a:fillRef idx="1">
+            <a:schemeClr val="accent1"/>
+          </a:fillRef>
+          <a:effectRef idx="0">
+            <a:schemeClr val="accent1"/>
+          </a:effectRef>
+          <a:fontRef idx="minor">
+            <a:schemeClr val="lt1"/>
+          </a:fontRef>
+        </p:style>
+        <p:txBody>
+          <a:bodyPr rtlCol="0" anchor="ctr"/>
+          <a:lstStyle/>
+          <a:p>
+            <a:pPr algn="ctr"/>
+            <a:endParaRPr lang="en-US"/>
+          </a:p>
+        </p:txBody>
+      </p:sp>
+      <p:sp>
+        <p:nvSpPr>
+          <p:cNvPr id="2" name="Title 1">
+            <a:extLst>
+              <a:ext uri="{FF2B5EF4-FFF2-40B4-BE49-F238E27FC236}">
+                <a16:creationId xmlns:a16="http://schemas.microsoft.com/office/drawing/2014/main" id="{53C5D828-9666-E312-B574-9FE965A7D6BE}"/>
+              </a:ext>
+            </a:extLst>
+          </p:cNvPr>
+          <p:cNvSpPr>
+            <a:spLocks noGrp="1"/>
+          </p:cNvSpPr>
+          <p:nvPr>
+            <p:ph type="title"/>
+          </p:nvPr>
+        </p:nvSpPr>
+        <p:spPr>
+          <a:xfrm>
+            <a:off x="889000" y="1967266"/>
+            <a:ext cx="2602345" cy="2547257"/>
+          </a:xfrm>
+          <a:noFill/>
+        </p:spPr>
+        <p:txBody>
+          <a:bodyPr vert="horz" lIns="91440" tIns="45720" rIns="91440" bIns="45720" rtlCol="0" anchor="ctr">
+            <a:normAutofit/>
+          </a:bodyPr>
+          <a:lstStyle/>
+          <a:p>
+            <a:pPr algn="ctr"/>
+            <a:r>
+              <a:rPr lang="en-US" sz="3600" dirty="0">
+                <a:solidFill>
+                  <a:srgbClr val="FFFFFF"/>
+                </a:solidFill>
+              </a:rPr>
+              <a:t>Ansible -  Demo</a:t>
+            </a:r>
+            <a:endParaRPr lang="en-US" sz="3600" kern="1200" dirty="0">
+              <a:solidFill>
+                <a:srgbClr val="FFFFFF"/>
+              </a:solidFill>
+              <a:latin typeface="+mj-lt"/>
+              <a:ea typeface="+mj-ea"/>
+              <a:cs typeface="+mj-cs"/>
+            </a:endParaRPr>
+          </a:p>
+        </p:txBody>
+      </p:sp>
+      <p:sp>
+        <p:nvSpPr>
+          <p:cNvPr id="3" name="Footer Placeholder 2">
+            <a:extLst>
+              <a:ext uri="{FF2B5EF4-FFF2-40B4-BE49-F238E27FC236}">
+                <a16:creationId xmlns:a16="http://schemas.microsoft.com/office/drawing/2014/main" id="{5AA19FA0-A765-8169-03F1-928E3EF7B595}"/>
+              </a:ext>
+            </a:extLst>
+          </p:cNvPr>
+          <p:cNvSpPr>
+            <a:spLocks noGrp="1"/>
+          </p:cNvSpPr>
+          <p:nvPr>
+            <p:ph type="ftr" sz="quarter" idx="11"/>
+          </p:nvPr>
+        </p:nvSpPr>
+        <p:spPr/>
+        <p:txBody>
+          <a:bodyPr/>
+          <a:lstStyle/>
+          <a:p>
+            <a:r>
+              <a:rPr lang="es-ES"/>
+              <a:t>Step 1 - Model - ver. 1</a:t>
+            </a:r>
+            <a:endParaRPr lang="ru-UA"/>
+          </a:p>
+        </p:txBody>
+      </p:sp>
+      <p:sp>
+        <p:nvSpPr>
+          <p:cNvPr id="4" name="Rectangle 3">
+            <a:extLst>
+              <a:ext uri="{FF2B5EF4-FFF2-40B4-BE49-F238E27FC236}">
+                <a16:creationId xmlns:a16="http://schemas.microsoft.com/office/drawing/2014/main" id="{03542100-9D21-41B2-EBC8-F5312B69ACDA}"/>
+              </a:ext>
+            </a:extLst>
+          </p:cNvPr>
+          <p:cNvSpPr/>
+          <p:nvPr/>
+        </p:nvSpPr>
+        <p:spPr>
+          <a:xfrm>
+            <a:off x="5777345" y="1967266"/>
+            <a:ext cx="5084619" cy="2940503"/>
+          </a:xfrm>
+          <a:prstGeom prst="rect">
+            <a:avLst/>
+          </a:prstGeom>
+        </p:spPr>
+        <p:style>
+          <a:lnRef idx="2">
+            <a:schemeClr val="accent1">
+              <a:shade val="15000"/>
+            </a:schemeClr>
+          </a:lnRef>
+          <a:fillRef idx="1">
+            <a:schemeClr val="accent1"/>
+          </a:fillRef>
+          <a:effectRef idx="0">
+            <a:schemeClr val="accent1"/>
+          </a:effectRef>
+          <a:fontRef idx="minor">
+            <a:schemeClr val="lt1"/>
+          </a:fontRef>
+        </p:style>
+        <p:txBody>
+          <a:bodyPr rtlCol="0" anchor="ctr"/>
+          <a:lstStyle/>
+          <a:p>
+            <a:pPr algn="ctr"/>
+            <a:endParaRPr lang="ru-UA"/>
+          </a:p>
+        </p:txBody>
+      </p:sp>
+    </p:spTree>
+    <p:extLst>
+      <p:ext uri="{BB962C8B-B14F-4D97-AF65-F5344CB8AC3E}">
+        <p14:creationId xmlns:p14="http://schemas.microsoft.com/office/powerpoint/2010/main" val="3114329589"/>
       </p:ext>
     </p:extLst>
   </p:cSld>

</xml_diff>